<commit_message>
Part I presentation done
</commit_message>
<xml_diff>
--- a/SCALA.pptx
+++ b/SCALA.pptx
@@ -4,12 +4,15 @@
   <p:sldMasterIdLst>
     <p:sldMasterId id="2147483648" r:id="rId1"/>
   </p:sldMasterIdLst>
+  <p:notesMasterIdLst>
+    <p:notesMasterId r:id="rId14"/>
+  </p:notesMasterIdLst>
   <p:sldIdLst>
     <p:sldId id="256" r:id="rId2"/>
     <p:sldId id="257" r:id="rId3"/>
     <p:sldId id="258" r:id="rId4"/>
-    <p:sldId id="259" r:id="rId5"/>
-    <p:sldId id="260" r:id="rId6"/>
+    <p:sldId id="260" r:id="rId5"/>
+    <p:sldId id="259" r:id="rId6"/>
     <p:sldId id="261" r:id="rId7"/>
     <p:sldId id="262" r:id="rId8"/>
     <p:sldId id="263" r:id="rId9"/>
@@ -123,6 +126,1224 @@
 </p:presentation>
 </file>
 
+<file path=ppt/commentAuthors.xml><?xml version="1.0" encoding="utf-8"?>
+<p:cmAuthorLst xmlns:a="http://schemas.openxmlformats.org/drawingml/2006/main" xmlns:r="http://schemas.openxmlformats.org/officeDocument/2006/relationships" xmlns:p="http://schemas.openxmlformats.org/presentationml/2006/main">
+  <p:cmAuthor id="1" name="Karol Lasek" initials="KL" lastIdx="1" clrIdx="0">
+    <p:extLst>
+      <p:ext uri="{19B8F6BF-5375-455C-9EA6-DF929625EA0E}">
+        <p15:presenceInfo xmlns:p15="http://schemas.microsoft.com/office/powerpoint/2012/main" userId="S::karol.lasek@ericsson.com::2dc527ee-2fc0-4917-a336-d3247e681c54" providerId="AD"/>
+      </p:ext>
+    </p:extLst>
+  </p:cmAuthor>
+</p:cmAuthorLst>
+</file>
+
+<file path=ppt/comments/comment1.xml><?xml version="1.0" encoding="utf-8"?>
+<p:cmLst xmlns:a="http://schemas.openxmlformats.org/drawingml/2006/main" xmlns:r="http://schemas.openxmlformats.org/officeDocument/2006/relationships" xmlns:p="http://schemas.openxmlformats.org/presentationml/2006/main">
+  <p:cm authorId="1" dt="2021-03-29T08:42:12.281" idx="1">
+    <p:pos x="10" y="10"/>
+    <p:text>Ranges są często używane do wypełniania struktur danych i iteracji w pętlach for. Zakresy zapewniają dużą moc za pomocą zaledwie kilku metod, jak pokazano w poniższych przykładach</p:text>
+    <p:extLst>
+      <p:ext uri="{C676402C-5697-4E1C-873F-D02D1690AC5C}">
+        <p15:threadingInfo xmlns:p15="http://schemas.microsoft.com/office/powerpoint/2012/main" timeZoneBias="-120"/>
+      </p:ext>
+    </p:extLst>
+  </p:cm>
+</p:cmLst>
+</file>
+
+<file path=ppt/notesMasters/notesMaster1.xml><?xml version="1.0" encoding="utf-8"?>
+<p:notesMaster xmlns:a="http://schemas.openxmlformats.org/drawingml/2006/main" xmlns:r="http://schemas.openxmlformats.org/officeDocument/2006/relationships" xmlns:p="http://schemas.openxmlformats.org/presentationml/2006/main">
+  <p:cSld>
+    <p:bg>
+      <p:bgRef idx="1001">
+        <a:schemeClr val="bg1"/>
+      </p:bgRef>
+    </p:bg>
+    <p:spTree>
+      <p:nvGrpSpPr>
+        <p:cNvPr id="1" name=""/>
+        <p:cNvGrpSpPr/>
+        <p:nvPr/>
+      </p:nvGrpSpPr>
+      <p:grpSpPr>
+        <a:xfrm>
+          <a:off x="0" y="0"/>
+          <a:ext cx="0" cy="0"/>
+          <a:chOff x="0" y="0"/>
+          <a:chExt cx="0" cy="0"/>
+        </a:xfrm>
+      </p:grpSpPr>
+      <p:sp>
+        <p:nvSpPr>
+          <p:cNvPr id="2" name="Header Placeholder 1"/>
+          <p:cNvSpPr>
+            <a:spLocks noGrp="1"/>
+          </p:cNvSpPr>
+          <p:nvPr>
+            <p:ph type="hdr" sz="quarter"/>
+          </p:nvPr>
+        </p:nvSpPr>
+        <p:spPr>
+          <a:xfrm>
+            <a:off x="0" y="0"/>
+            <a:ext cx="2971800" cy="458788"/>
+          </a:xfrm>
+          <a:prstGeom prst="rect">
+            <a:avLst/>
+          </a:prstGeom>
+        </p:spPr>
+        <p:txBody>
+          <a:bodyPr vert="horz" lIns="91440" tIns="45720" rIns="91440" bIns="45720" rtlCol="0"/>
+          <a:lstStyle>
+            <a:lvl1pPr algn="l">
+              <a:defRPr sz="1200"/>
+            </a:lvl1pPr>
+          </a:lstStyle>
+          <a:p>
+            <a:endParaRPr lang="pl-PL"/>
+          </a:p>
+        </p:txBody>
+      </p:sp>
+      <p:sp>
+        <p:nvSpPr>
+          <p:cNvPr id="3" name="Date Placeholder 2"/>
+          <p:cNvSpPr>
+            <a:spLocks noGrp="1"/>
+          </p:cNvSpPr>
+          <p:nvPr>
+            <p:ph type="dt" idx="1"/>
+          </p:nvPr>
+        </p:nvSpPr>
+        <p:spPr>
+          <a:xfrm>
+            <a:off x="3884613" y="0"/>
+            <a:ext cx="2971800" cy="458788"/>
+          </a:xfrm>
+          <a:prstGeom prst="rect">
+            <a:avLst/>
+          </a:prstGeom>
+        </p:spPr>
+        <p:txBody>
+          <a:bodyPr vert="horz" lIns="91440" tIns="45720" rIns="91440" bIns="45720" rtlCol="0"/>
+          <a:lstStyle>
+            <a:lvl1pPr algn="r">
+              <a:defRPr sz="1200"/>
+            </a:lvl1pPr>
+          </a:lstStyle>
+          <a:p>
+            <a:fld id="{C5CD1456-AA00-4668-A255-DC6FE20BE111}" type="datetimeFigureOut">
+              <a:rPr lang="pl-PL" smtClean="0"/>
+              <a:t>29.03.2021</a:t>
+            </a:fld>
+            <a:endParaRPr lang="pl-PL"/>
+          </a:p>
+        </p:txBody>
+      </p:sp>
+      <p:sp>
+        <p:nvSpPr>
+          <p:cNvPr id="4" name="Slide Image Placeholder 3"/>
+          <p:cNvSpPr>
+            <a:spLocks noGrp="1" noRot="1" noChangeAspect="1"/>
+          </p:cNvSpPr>
+          <p:nvPr>
+            <p:ph type="sldImg" idx="2"/>
+          </p:nvPr>
+        </p:nvSpPr>
+        <p:spPr>
+          <a:xfrm>
+            <a:off x="685800" y="1143000"/>
+            <a:ext cx="5486400" cy="3086100"/>
+          </a:xfrm>
+          <a:prstGeom prst="rect">
+            <a:avLst/>
+          </a:prstGeom>
+          <a:noFill/>
+          <a:ln w="12700">
+            <a:solidFill>
+              <a:prstClr val="black"/>
+            </a:solidFill>
+          </a:ln>
+        </p:spPr>
+        <p:txBody>
+          <a:bodyPr vert="horz" lIns="91440" tIns="45720" rIns="91440" bIns="45720" rtlCol="0" anchor="ctr"/>
+          <a:lstStyle/>
+          <a:p>
+            <a:endParaRPr lang="pl-PL"/>
+          </a:p>
+        </p:txBody>
+      </p:sp>
+      <p:sp>
+        <p:nvSpPr>
+          <p:cNvPr id="5" name="Notes Placeholder 4"/>
+          <p:cNvSpPr>
+            <a:spLocks noGrp="1"/>
+          </p:cNvSpPr>
+          <p:nvPr>
+            <p:ph type="body" sz="quarter" idx="3"/>
+          </p:nvPr>
+        </p:nvSpPr>
+        <p:spPr>
+          <a:xfrm>
+            <a:off x="685800" y="4400550"/>
+            <a:ext cx="5486400" cy="3600450"/>
+          </a:xfrm>
+          <a:prstGeom prst="rect">
+            <a:avLst/>
+          </a:prstGeom>
+        </p:spPr>
+        <p:txBody>
+          <a:bodyPr vert="horz" lIns="91440" tIns="45720" rIns="91440" bIns="45720" rtlCol="0"/>
+          <a:lstStyle/>
+          <a:p>
+            <a:pPr lvl="0"/>
+            <a:r>
+              <a:rPr lang="en-US"/>
+              <a:t>Click to edit Master text styles</a:t>
+            </a:r>
+          </a:p>
+          <a:p>
+            <a:pPr lvl="1"/>
+            <a:r>
+              <a:rPr lang="en-US"/>
+              <a:t>Second level</a:t>
+            </a:r>
+          </a:p>
+          <a:p>
+            <a:pPr lvl="2"/>
+            <a:r>
+              <a:rPr lang="en-US"/>
+              <a:t>Third level</a:t>
+            </a:r>
+          </a:p>
+          <a:p>
+            <a:pPr lvl="3"/>
+            <a:r>
+              <a:rPr lang="en-US"/>
+              <a:t>Fourth level</a:t>
+            </a:r>
+          </a:p>
+          <a:p>
+            <a:pPr lvl="4"/>
+            <a:r>
+              <a:rPr lang="en-US"/>
+              <a:t>Fifth level</a:t>
+            </a:r>
+            <a:endParaRPr lang="pl-PL"/>
+          </a:p>
+        </p:txBody>
+      </p:sp>
+      <p:sp>
+        <p:nvSpPr>
+          <p:cNvPr id="6" name="Footer Placeholder 5"/>
+          <p:cNvSpPr>
+            <a:spLocks noGrp="1"/>
+          </p:cNvSpPr>
+          <p:nvPr>
+            <p:ph type="ftr" sz="quarter" idx="4"/>
+          </p:nvPr>
+        </p:nvSpPr>
+        <p:spPr>
+          <a:xfrm>
+            <a:off x="0" y="8685213"/>
+            <a:ext cx="2971800" cy="458787"/>
+          </a:xfrm>
+          <a:prstGeom prst="rect">
+            <a:avLst/>
+          </a:prstGeom>
+        </p:spPr>
+        <p:txBody>
+          <a:bodyPr vert="horz" lIns="91440" tIns="45720" rIns="91440" bIns="45720" rtlCol="0" anchor="b"/>
+          <a:lstStyle>
+            <a:lvl1pPr algn="l">
+              <a:defRPr sz="1200"/>
+            </a:lvl1pPr>
+          </a:lstStyle>
+          <a:p>
+            <a:endParaRPr lang="pl-PL"/>
+          </a:p>
+        </p:txBody>
+      </p:sp>
+      <p:sp>
+        <p:nvSpPr>
+          <p:cNvPr id="7" name="Slide Number Placeholder 6"/>
+          <p:cNvSpPr>
+            <a:spLocks noGrp="1"/>
+          </p:cNvSpPr>
+          <p:nvPr>
+            <p:ph type="sldNum" sz="quarter" idx="5"/>
+          </p:nvPr>
+        </p:nvSpPr>
+        <p:spPr>
+          <a:xfrm>
+            <a:off x="3884613" y="8685213"/>
+            <a:ext cx="2971800" cy="458787"/>
+          </a:xfrm>
+          <a:prstGeom prst="rect">
+            <a:avLst/>
+          </a:prstGeom>
+        </p:spPr>
+        <p:txBody>
+          <a:bodyPr vert="horz" lIns="91440" tIns="45720" rIns="91440" bIns="45720" rtlCol="0" anchor="b"/>
+          <a:lstStyle>
+            <a:lvl1pPr algn="r">
+              <a:defRPr sz="1200"/>
+            </a:lvl1pPr>
+          </a:lstStyle>
+          <a:p>
+            <a:fld id="{6839968B-1966-479B-907B-2C4A53864213}" type="slidenum">
+              <a:rPr lang="pl-PL" smtClean="0"/>
+              <a:t>‹#›</a:t>
+            </a:fld>
+            <a:endParaRPr lang="pl-PL"/>
+          </a:p>
+        </p:txBody>
+      </p:sp>
+    </p:spTree>
+    <p:extLst>
+      <p:ext uri="{BB962C8B-B14F-4D97-AF65-F5344CB8AC3E}">
+        <p14:creationId xmlns:p14="http://schemas.microsoft.com/office/powerpoint/2010/main" val="3407214615"/>
+      </p:ext>
+    </p:extLst>
+  </p:cSld>
+  <p:clrMap bg1="lt1" tx1="dk1" bg2="lt2" tx2="dk2" accent1="accent1" accent2="accent2" accent3="accent3" accent4="accent4" accent5="accent5" accent6="accent6" hlink="hlink" folHlink="folHlink"/>
+  <p:notesStyle>
+    <a:lvl1pPr marL="0" algn="l" defTabSz="914400" rtl="0" eaLnBrk="1" latinLnBrk="0" hangingPunct="1">
+      <a:defRPr sz="1200" kern="1200">
+        <a:solidFill>
+          <a:schemeClr val="tx1"/>
+        </a:solidFill>
+        <a:latin typeface="+mn-lt"/>
+        <a:ea typeface="+mn-ea"/>
+        <a:cs typeface="+mn-cs"/>
+      </a:defRPr>
+    </a:lvl1pPr>
+    <a:lvl2pPr marL="457200" algn="l" defTabSz="914400" rtl="0" eaLnBrk="1" latinLnBrk="0" hangingPunct="1">
+      <a:defRPr sz="1200" kern="1200">
+        <a:solidFill>
+          <a:schemeClr val="tx1"/>
+        </a:solidFill>
+        <a:latin typeface="+mn-lt"/>
+        <a:ea typeface="+mn-ea"/>
+        <a:cs typeface="+mn-cs"/>
+      </a:defRPr>
+    </a:lvl2pPr>
+    <a:lvl3pPr marL="914400" algn="l" defTabSz="914400" rtl="0" eaLnBrk="1" latinLnBrk="0" hangingPunct="1">
+      <a:defRPr sz="1200" kern="1200">
+        <a:solidFill>
+          <a:schemeClr val="tx1"/>
+        </a:solidFill>
+        <a:latin typeface="+mn-lt"/>
+        <a:ea typeface="+mn-ea"/>
+        <a:cs typeface="+mn-cs"/>
+      </a:defRPr>
+    </a:lvl3pPr>
+    <a:lvl4pPr marL="1371600" algn="l" defTabSz="914400" rtl="0" eaLnBrk="1" latinLnBrk="0" hangingPunct="1">
+      <a:defRPr sz="1200" kern="1200">
+        <a:solidFill>
+          <a:schemeClr val="tx1"/>
+        </a:solidFill>
+        <a:latin typeface="+mn-lt"/>
+        <a:ea typeface="+mn-ea"/>
+        <a:cs typeface="+mn-cs"/>
+      </a:defRPr>
+    </a:lvl4pPr>
+    <a:lvl5pPr marL="1828800" algn="l" defTabSz="914400" rtl="0" eaLnBrk="1" latinLnBrk="0" hangingPunct="1">
+      <a:defRPr sz="1200" kern="1200">
+        <a:solidFill>
+          <a:schemeClr val="tx1"/>
+        </a:solidFill>
+        <a:latin typeface="+mn-lt"/>
+        <a:ea typeface="+mn-ea"/>
+        <a:cs typeface="+mn-cs"/>
+      </a:defRPr>
+    </a:lvl5pPr>
+    <a:lvl6pPr marL="2286000" algn="l" defTabSz="914400" rtl="0" eaLnBrk="1" latinLnBrk="0" hangingPunct="1">
+      <a:defRPr sz="1200" kern="1200">
+        <a:solidFill>
+          <a:schemeClr val="tx1"/>
+        </a:solidFill>
+        <a:latin typeface="+mn-lt"/>
+        <a:ea typeface="+mn-ea"/>
+        <a:cs typeface="+mn-cs"/>
+      </a:defRPr>
+    </a:lvl6pPr>
+    <a:lvl7pPr marL="2743200" algn="l" defTabSz="914400" rtl="0" eaLnBrk="1" latinLnBrk="0" hangingPunct="1">
+      <a:defRPr sz="1200" kern="1200">
+        <a:solidFill>
+          <a:schemeClr val="tx1"/>
+        </a:solidFill>
+        <a:latin typeface="+mn-lt"/>
+        <a:ea typeface="+mn-ea"/>
+        <a:cs typeface="+mn-cs"/>
+      </a:defRPr>
+    </a:lvl7pPr>
+    <a:lvl8pPr marL="3200400" algn="l" defTabSz="914400" rtl="0" eaLnBrk="1" latinLnBrk="0" hangingPunct="1">
+      <a:defRPr sz="1200" kern="1200">
+        <a:solidFill>
+          <a:schemeClr val="tx1"/>
+        </a:solidFill>
+        <a:latin typeface="+mn-lt"/>
+        <a:ea typeface="+mn-ea"/>
+        <a:cs typeface="+mn-cs"/>
+      </a:defRPr>
+    </a:lvl8pPr>
+    <a:lvl9pPr marL="3657600" algn="l" defTabSz="914400" rtl="0" eaLnBrk="1" latinLnBrk="0" hangingPunct="1">
+      <a:defRPr sz="1200" kern="1200">
+        <a:solidFill>
+          <a:schemeClr val="tx1"/>
+        </a:solidFill>
+        <a:latin typeface="+mn-lt"/>
+        <a:ea typeface="+mn-ea"/>
+        <a:cs typeface="+mn-cs"/>
+      </a:defRPr>
+    </a:lvl9pPr>
+  </p:notesStyle>
+</p:notesMaster>
+</file>
+
+<file path=ppt/notesSlides/notesSlide1.xml><?xml version="1.0" encoding="utf-8"?>
+<p:notes xmlns:a="http://schemas.openxmlformats.org/drawingml/2006/main" xmlns:r="http://schemas.openxmlformats.org/officeDocument/2006/relationships" xmlns:p="http://schemas.openxmlformats.org/presentationml/2006/main">
+  <p:cSld>
+    <p:spTree>
+      <p:nvGrpSpPr>
+        <p:cNvPr id="1" name=""/>
+        <p:cNvGrpSpPr/>
+        <p:nvPr/>
+      </p:nvGrpSpPr>
+      <p:grpSpPr>
+        <a:xfrm>
+          <a:off x="0" y="0"/>
+          <a:ext cx="0" cy="0"/>
+          <a:chOff x="0" y="0"/>
+          <a:chExt cx="0" cy="0"/>
+        </a:xfrm>
+      </p:grpSpPr>
+      <p:sp>
+        <p:nvSpPr>
+          <p:cNvPr id="2" name="Slide Image Placeholder 1"/>
+          <p:cNvSpPr>
+            <a:spLocks noGrp="1" noRot="1" noChangeAspect="1"/>
+          </p:cNvSpPr>
+          <p:nvPr>
+            <p:ph type="sldImg"/>
+          </p:nvPr>
+        </p:nvSpPr>
+        <p:spPr/>
+      </p:sp>
+      <p:sp>
+        <p:nvSpPr>
+          <p:cNvPr id="3" name="Notes Placeholder 2"/>
+          <p:cNvSpPr>
+            <a:spLocks noGrp="1"/>
+          </p:cNvSpPr>
+          <p:nvPr>
+            <p:ph type="body" idx="1"/>
+          </p:nvPr>
+        </p:nvSpPr>
+        <p:spPr/>
+        <p:txBody>
+          <a:bodyPr/>
+          <a:lstStyle/>
+          <a:p>
+            <a:pPr marL="0" marR="0" lvl="0" indent="0" algn="l" defTabSz="914400" rtl="0" eaLnBrk="1" fontAlgn="auto" latinLnBrk="0" hangingPunct="1">
+              <a:lnSpc>
+                <a:spcPct val="100000"/>
+              </a:lnSpc>
+              <a:spcBef>
+                <a:spcPts val="0"/>
+              </a:spcBef>
+              <a:spcAft>
+                <a:spcPts val="0"/>
+              </a:spcAft>
+              <a:buClrTx/>
+              <a:buSzTx/>
+              <a:buFontTx/>
+              <a:buNone/>
+              <a:tabLst/>
+              <a:defRPr/>
+            </a:pPr>
+            <a:r>
+              <a:rPr lang="pl-PL" dirty="0"/>
+              <a:t>Język programowania Scala udostępnia 3 typy pętli</a:t>
+            </a:r>
+            <a:br>
+              <a:rPr lang="pl-PL" dirty="0"/>
+            </a:br>
+            <a:r>
+              <a:rPr lang="pl-PL" dirty="0"/>
+              <a:t>pętla </a:t>
+            </a:r>
+            <a:r>
+              <a:rPr lang="pl-PL" dirty="0" err="1"/>
+              <a:t>while</a:t>
+            </a:r>
+            <a:r>
+              <a:rPr lang="pl-PL" dirty="0"/>
+              <a:t> Powtarza instrukcję lub grupę instrukcji, gdy dany warunek jest prawdziwy. Testuje warunek przed wykonaniem treści pętli.</a:t>
+            </a:r>
+            <a:br>
+              <a:rPr lang="pl-PL" dirty="0"/>
+            </a:br>
+            <a:r>
+              <a:rPr lang="pl-PL" dirty="0"/>
+              <a:t>pętla do-</a:t>
+            </a:r>
+            <a:r>
+              <a:rPr lang="pl-PL" dirty="0" err="1"/>
+              <a:t>while</a:t>
+            </a:r>
+            <a:r>
+              <a:rPr lang="pl-PL" dirty="0"/>
+              <a:t> Podobnie jak instrukcja </a:t>
+            </a:r>
+            <a:r>
+              <a:rPr lang="pl-PL" dirty="0" err="1"/>
+              <a:t>while</a:t>
+            </a:r>
+            <a:r>
+              <a:rPr lang="pl-PL" dirty="0"/>
+              <a:t>, z tą różnicą, że testuje warunek na końcu treści pętli.</a:t>
+            </a:r>
+          </a:p>
+          <a:p>
+            <a:pPr marL="0" marR="0" lvl="0" indent="0" algn="l" defTabSz="914400" rtl="0" eaLnBrk="1" fontAlgn="auto" latinLnBrk="0" hangingPunct="1">
+              <a:lnSpc>
+                <a:spcPct val="100000"/>
+              </a:lnSpc>
+              <a:spcBef>
+                <a:spcPts val="0"/>
+              </a:spcBef>
+              <a:spcAft>
+                <a:spcPts val="0"/>
+              </a:spcAft>
+              <a:buClrTx/>
+              <a:buSzTx/>
+              <a:buFontTx/>
+              <a:buNone/>
+              <a:tabLst/>
+              <a:defRPr/>
+            </a:pPr>
+            <a:r>
+              <a:rPr lang="pl-PL" dirty="0"/>
+              <a:t>Pętla for Wykonuje sekwencję instrukcji wiele razy</a:t>
+            </a:r>
+            <a:br>
+              <a:rPr lang="pl-PL" dirty="0"/>
+            </a:br>
+            <a:r>
+              <a:rPr lang="pl-PL" dirty="0"/>
+              <a:t>Jednakże tak jak w Javie mamy </a:t>
+            </a:r>
+            <a:r>
+              <a:rPr lang="pl-PL" dirty="0" err="1"/>
+              <a:t>break</a:t>
+            </a:r>
+            <a:r>
+              <a:rPr lang="pl-PL" dirty="0"/>
+              <a:t> i </a:t>
+            </a:r>
+            <a:r>
+              <a:rPr lang="pl-PL" dirty="0" err="1"/>
+              <a:t>continue</a:t>
+            </a:r>
+            <a:r>
+              <a:rPr lang="pl-PL" dirty="0"/>
+              <a:t>, tak w Scali nie mamy możliwości korzystania z nich. Dopiero od Scali wersji 2.8 istnieje opcja skorzystania z opcji </a:t>
+            </a:r>
+            <a:r>
+              <a:rPr lang="pl-PL" dirty="0" err="1"/>
+              <a:t>loop.break</a:t>
+            </a:r>
+            <a:endParaRPr lang="pl-PL" dirty="0"/>
+          </a:p>
+        </p:txBody>
+      </p:sp>
+      <p:sp>
+        <p:nvSpPr>
+          <p:cNvPr id="4" name="Slide Number Placeholder 3"/>
+          <p:cNvSpPr>
+            <a:spLocks noGrp="1"/>
+          </p:cNvSpPr>
+          <p:nvPr>
+            <p:ph type="sldNum" sz="quarter" idx="5"/>
+          </p:nvPr>
+        </p:nvSpPr>
+        <p:spPr/>
+        <p:txBody>
+          <a:bodyPr/>
+          <a:lstStyle/>
+          <a:p>
+            <a:fld id="{6839968B-1966-479B-907B-2C4A53864213}" type="slidenum">
+              <a:rPr lang="pl-PL" smtClean="0"/>
+              <a:t>3</a:t>
+            </a:fld>
+            <a:endParaRPr lang="pl-PL"/>
+          </a:p>
+        </p:txBody>
+      </p:sp>
+    </p:spTree>
+    <p:extLst>
+      <p:ext uri="{BB962C8B-B14F-4D97-AF65-F5344CB8AC3E}">
+        <p14:creationId xmlns:p14="http://schemas.microsoft.com/office/powerpoint/2010/main" val="2750501387"/>
+      </p:ext>
+    </p:extLst>
+  </p:cSld>
+  <p:clrMapOvr>
+    <a:masterClrMapping/>
+  </p:clrMapOvr>
+</p:notes>
+</file>
+
+<file path=ppt/notesSlides/notesSlide2.xml><?xml version="1.0" encoding="utf-8"?>
+<p:notes xmlns:a="http://schemas.openxmlformats.org/drawingml/2006/main" xmlns:r="http://schemas.openxmlformats.org/officeDocument/2006/relationships" xmlns:p="http://schemas.openxmlformats.org/presentationml/2006/main">
+  <p:cSld>
+    <p:spTree>
+      <p:nvGrpSpPr>
+        <p:cNvPr id="1" name=""/>
+        <p:cNvGrpSpPr/>
+        <p:nvPr/>
+      </p:nvGrpSpPr>
+      <p:grpSpPr>
+        <a:xfrm>
+          <a:off x="0" y="0"/>
+          <a:ext cx="0" cy="0"/>
+          <a:chOff x="0" y="0"/>
+          <a:chExt cx="0" cy="0"/>
+        </a:xfrm>
+      </p:grpSpPr>
+      <p:sp>
+        <p:nvSpPr>
+          <p:cNvPr id="2" name="Slide Image Placeholder 1"/>
+          <p:cNvSpPr>
+            <a:spLocks noGrp="1" noRot="1" noChangeAspect="1"/>
+          </p:cNvSpPr>
+          <p:nvPr>
+            <p:ph type="sldImg"/>
+          </p:nvPr>
+        </p:nvSpPr>
+        <p:spPr/>
+      </p:sp>
+      <p:sp>
+        <p:nvSpPr>
+          <p:cNvPr id="3" name="Notes Placeholder 2"/>
+          <p:cNvSpPr>
+            <a:spLocks noGrp="1"/>
+          </p:cNvSpPr>
+          <p:nvPr>
+            <p:ph type="body" idx="1"/>
+          </p:nvPr>
+        </p:nvSpPr>
+        <p:spPr/>
+        <p:txBody>
+          <a:bodyPr/>
+          <a:lstStyle/>
+          <a:p>
+            <a:pPr marL="0" marR="0" lvl="0" indent="0" algn="l" defTabSz="914400" rtl="0" eaLnBrk="1" fontAlgn="auto" latinLnBrk="0" hangingPunct="1">
+              <a:lnSpc>
+                <a:spcPct val="100000"/>
+              </a:lnSpc>
+              <a:spcBef>
+                <a:spcPts val="0"/>
+              </a:spcBef>
+              <a:spcAft>
+                <a:spcPts val="0"/>
+              </a:spcAft>
+              <a:buClrTx/>
+              <a:buSzTx/>
+              <a:buFontTx/>
+              <a:buNone/>
+              <a:tabLst/>
+              <a:defRPr/>
+            </a:pPr>
+            <a:r>
+              <a:rPr lang="pl-PL" sz="1200" kern="1200" dirty="0" err="1">
+                <a:solidFill>
+                  <a:schemeClr val="tx1"/>
+                </a:solidFill>
+                <a:effectLst/>
+                <a:latin typeface="+mn-lt"/>
+                <a:ea typeface="+mn-ea"/>
+                <a:cs typeface="+mn-cs"/>
+              </a:rPr>
+              <a:t>Ranges</a:t>
+            </a:r>
+            <a:r>
+              <a:rPr lang="pl-PL" sz="1200" kern="1200" dirty="0">
+                <a:solidFill>
+                  <a:schemeClr val="tx1"/>
+                </a:solidFill>
+                <a:effectLst/>
+                <a:latin typeface="+mn-lt"/>
+                <a:ea typeface="+mn-ea"/>
+                <a:cs typeface="+mn-cs"/>
+              </a:rPr>
+              <a:t> są często używane do wypełniania struktur danych i iteracji w pętlach for. Zakresy zapewniają dużą moc za pomocą zaledwie kilku metod, jak pokazano w poniższych przykładach</a:t>
+            </a:r>
+          </a:p>
+          <a:p>
+            <a:endParaRPr lang="pl-PL" dirty="0"/>
+          </a:p>
+        </p:txBody>
+      </p:sp>
+      <p:sp>
+        <p:nvSpPr>
+          <p:cNvPr id="4" name="Slide Number Placeholder 3"/>
+          <p:cNvSpPr>
+            <a:spLocks noGrp="1"/>
+          </p:cNvSpPr>
+          <p:nvPr>
+            <p:ph type="sldNum" sz="quarter" idx="5"/>
+          </p:nvPr>
+        </p:nvSpPr>
+        <p:spPr/>
+        <p:txBody>
+          <a:bodyPr/>
+          <a:lstStyle/>
+          <a:p>
+            <a:fld id="{6839968B-1966-479B-907B-2C4A53864213}" type="slidenum">
+              <a:rPr lang="pl-PL" smtClean="0"/>
+              <a:t>4</a:t>
+            </a:fld>
+            <a:endParaRPr lang="pl-PL"/>
+          </a:p>
+        </p:txBody>
+      </p:sp>
+    </p:spTree>
+    <p:extLst>
+      <p:ext uri="{BB962C8B-B14F-4D97-AF65-F5344CB8AC3E}">
+        <p14:creationId xmlns:p14="http://schemas.microsoft.com/office/powerpoint/2010/main" val="566362829"/>
+      </p:ext>
+    </p:extLst>
+  </p:cSld>
+  <p:clrMapOvr>
+    <a:masterClrMapping/>
+  </p:clrMapOvr>
+</p:notes>
+</file>
+
+<file path=ppt/notesSlides/notesSlide3.xml><?xml version="1.0" encoding="utf-8"?>
+<p:notes xmlns:a="http://schemas.openxmlformats.org/drawingml/2006/main" xmlns:r="http://schemas.openxmlformats.org/officeDocument/2006/relationships" xmlns:p="http://schemas.openxmlformats.org/presentationml/2006/main">
+  <p:cSld>
+    <p:spTree>
+      <p:nvGrpSpPr>
+        <p:cNvPr id="1" name=""/>
+        <p:cNvGrpSpPr/>
+        <p:nvPr/>
+      </p:nvGrpSpPr>
+      <p:grpSpPr>
+        <a:xfrm>
+          <a:off x="0" y="0"/>
+          <a:ext cx="0" cy="0"/>
+          <a:chOff x="0" y="0"/>
+          <a:chExt cx="0" cy="0"/>
+        </a:xfrm>
+      </p:grpSpPr>
+      <p:sp>
+        <p:nvSpPr>
+          <p:cNvPr id="2" name="Slide Image Placeholder 1"/>
+          <p:cNvSpPr>
+            <a:spLocks noGrp="1" noRot="1" noChangeAspect="1"/>
+          </p:cNvSpPr>
+          <p:nvPr>
+            <p:ph type="sldImg"/>
+          </p:nvPr>
+        </p:nvSpPr>
+        <p:spPr/>
+      </p:sp>
+      <p:sp>
+        <p:nvSpPr>
+          <p:cNvPr id="3" name="Notes Placeholder 2"/>
+          <p:cNvSpPr>
+            <a:spLocks noGrp="1"/>
+          </p:cNvSpPr>
+          <p:nvPr>
+            <p:ph type="body" idx="1"/>
+          </p:nvPr>
+        </p:nvSpPr>
+        <p:spPr/>
+        <p:txBody>
+          <a:bodyPr/>
+          <a:lstStyle/>
+          <a:p>
+            <a:r>
+              <a:rPr lang="pl-PL" dirty="0"/>
+              <a:t>W celu iteracji kolekcji elementów i </a:t>
+            </a:r>
+            <a:r>
+              <a:rPr lang="pl-PL" dirty="0" err="1"/>
+              <a:t>wyprintowania</a:t>
+            </a:r>
+            <a:r>
+              <a:rPr lang="pl-PL" dirty="0"/>
+              <a:t> jej zawartości można również użyć metody </a:t>
+            </a:r>
+            <a:r>
+              <a:rPr lang="pl-PL" dirty="0" err="1"/>
+              <a:t>foreach</a:t>
+            </a:r>
+            <a:r>
+              <a:rPr lang="pl-PL" dirty="0"/>
+              <a:t>, która jest dostępna dla klas kolekcji Scala. Na przykład, w ten sposób można użyć </a:t>
+            </a:r>
+            <a:r>
+              <a:rPr lang="pl-PL" dirty="0" err="1"/>
+              <a:t>foreach</a:t>
+            </a:r>
+            <a:r>
+              <a:rPr lang="pl-PL" dirty="0"/>
+              <a:t> do </a:t>
+            </a:r>
+            <a:r>
+              <a:rPr lang="pl-PL" dirty="0" err="1"/>
+              <a:t>wyprintowania</a:t>
+            </a:r>
+            <a:r>
+              <a:rPr lang="pl-PL" dirty="0"/>
+              <a:t> listy </a:t>
+            </a:r>
+            <a:r>
+              <a:rPr lang="pl-PL" dirty="0" err="1"/>
+              <a:t>intów</a:t>
+            </a:r>
+            <a:r>
+              <a:rPr lang="pl-PL" dirty="0"/>
+              <a:t>:</a:t>
+            </a:r>
+          </a:p>
+        </p:txBody>
+      </p:sp>
+      <p:sp>
+        <p:nvSpPr>
+          <p:cNvPr id="4" name="Slide Number Placeholder 3"/>
+          <p:cNvSpPr>
+            <a:spLocks noGrp="1"/>
+          </p:cNvSpPr>
+          <p:nvPr>
+            <p:ph type="sldNum" sz="quarter" idx="5"/>
+          </p:nvPr>
+        </p:nvSpPr>
+        <p:spPr/>
+        <p:txBody>
+          <a:bodyPr/>
+          <a:lstStyle/>
+          <a:p>
+            <a:fld id="{6839968B-1966-479B-907B-2C4A53864213}" type="slidenum">
+              <a:rPr lang="pl-PL" smtClean="0"/>
+              <a:t>5</a:t>
+            </a:fld>
+            <a:endParaRPr lang="pl-PL"/>
+          </a:p>
+        </p:txBody>
+      </p:sp>
+    </p:spTree>
+    <p:extLst>
+      <p:ext uri="{BB962C8B-B14F-4D97-AF65-F5344CB8AC3E}">
+        <p14:creationId xmlns:p14="http://schemas.microsoft.com/office/powerpoint/2010/main" val="4119098439"/>
+      </p:ext>
+    </p:extLst>
+  </p:cSld>
+  <p:clrMapOvr>
+    <a:masterClrMapping/>
+  </p:clrMapOvr>
+</p:notes>
+</file>
+
+<file path=ppt/notesSlides/notesSlide4.xml><?xml version="1.0" encoding="utf-8"?>
+<p:notes xmlns:a="http://schemas.openxmlformats.org/drawingml/2006/main" xmlns:r="http://schemas.openxmlformats.org/officeDocument/2006/relationships" xmlns:p="http://schemas.openxmlformats.org/presentationml/2006/main">
+  <p:cSld>
+    <p:spTree>
+      <p:nvGrpSpPr>
+        <p:cNvPr id="1" name=""/>
+        <p:cNvGrpSpPr/>
+        <p:nvPr/>
+      </p:nvGrpSpPr>
+      <p:grpSpPr>
+        <a:xfrm>
+          <a:off x="0" y="0"/>
+          <a:ext cx="0" cy="0"/>
+          <a:chOff x="0" y="0"/>
+          <a:chExt cx="0" cy="0"/>
+        </a:xfrm>
+      </p:grpSpPr>
+      <p:sp>
+        <p:nvSpPr>
+          <p:cNvPr id="2" name="Slide Image Placeholder 1"/>
+          <p:cNvSpPr>
+            <a:spLocks noGrp="1" noRot="1" noChangeAspect="1"/>
+          </p:cNvSpPr>
+          <p:nvPr>
+            <p:ph type="sldImg"/>
+          </p:nvPr>
+        </p:nvSpPr>
+        <p:spPr/>
+      </p:sp>
+      <p:sp>
+        <p:nvSpPr>
+          <p:cNvPr id="3" name="Notes Placeholder 2"/>
+          <p:cNvSpPr>
+            <a:spLocks noGrp="1"/>
+          </p:cNvSpPr>
+          <p:nvPr>
+            <p:ph type="body" idx="1"/>
+          </p:nvPr>
+        </p:nvSpPr>
+        <p:spPr/>
+        <p:txBody>
+          <a:bodyPr/>
+          <a:lstStyle/>
+          <a:p>
+            <a:r>
+              <a:rPr lang="pl-PL" dirty="0"/>
+              <a:t>Scala zapewnia strukturę danych, tablicę, która przechowuje sekwencyjną kolekcję elementów tego samego typu o stałym rozmiarze. Zamiast deklarować pojedyncze zmienne, takie jak liczba0, liczba1, ... i liczba99, deklarujesz jedną zmienną tablicową, taką jak liczby, i używasz liczb [0], liczb [1] i ..., liczb [99]</a:t>
+            </a:r>
+            <a:br>
+              <a:rPr lang="pl-PL" dirty="0"/>
+            </a:br>
+            <a:br>
+              <a:rPr lang="pl-PL" dirty="0"/>
+            </a:br>
+            <a:r>
+              <a:rPr lang="pl-PL" dirty="0"/>
+              <a:t>Struktura tablicy + przykładowy kod z zaprezentowaniem jak się tworzy tablicę oraz przykładowe operacje wykonane na niej</a:t>
+            </a:r>
+          </a:p>
+        </p:txBody>
+      </p:sp>
+      <p:sp>
+        <p:nvSpPr>
+          <p:cNvPr id="4" name="Slide Number Placeholder 3"/>
+          <p:cNvSpPr>
+            <a:spLocks noGrp="1"/>
+          </p:cNvSpPr>
+          <p:nvPr>
+            <p:ph type="sldNum" sz="quarter" idx="5"/>
+          </p:nvPr>
+        </p:nvSpPr>
+        <p:spPr/>
+        <p:txBody>
+          <a:bodyPr/>
+          <a:lstStyle/>
+          <a:p>
+            <a:fld id="{6839968B-1966-479B-907B-2C4A53864213}" type="slidenum">
+              <a:rPr lang="pl-PL" smtClean="0"/>
+              <a:t>6</a:t>
+            </a:fld>
+            <a:endParaRPr lang="pl-PL"/>
+          </a:p>
+        </p:txBody>
+      </p:sp>
+    </p:spTree>
+    <p:extLst>
+      <p:ext uri="{BB962C8B-B14F-4D97-AF65-F5344CB8AC3E}">
+        <p14:creationId xmlns:p14="http://schemas.microsoft.com/office/powerpoint/2010/main" val="2070515521"/>
+      </p:ext>
+    </p:extLst>
+  </p:cSld>
+  <p:clrMapOvr>
+    <a:masterClrMapping/>
+  </p:clrMapOvr>
+</p:notes>
+</file>
+
+<file path=ppt/notesSlides/notesSlide5.xml><?xml version="1.0" encoding="utf-8"?>
+<p:notes xmlns:a="http://schemas.openxmlformats.org/drawingml/2006/main" xmlns:r="http://schemas.openxmlformats.org/officeDocument/2006/relationships" xmlns:p="http://schemas.openxmlformats.org/presentationml/2006/main">
+  <p:cSld>
+    <p:spTree>
+      <p:nvGrpSpPr>
+        <p:cNvPr id="1" name=""/>
+        <p:cNvGrpSpPr/>
+        <p:nvPr/>
+      </p:nvGrpSpPr>
+      <p:grpSpPr>
+        <a:xfrm>
+          <a:off x="0" y="0"/>
+          <a:ext cx="0" cy="0"/>
+          <a:chOff x="0" y="0"/>
+          <a:chExt cx="0" cy="0"/>
+        </a:xfrm>
+      </p:grpSpPr>
+      <p:sp>
+        <p:nvSpPr>
+          <p:cNvPr id="2" name="Slide Image Placeholder 1"/>
+          <p:cNvSpPr>
+            <a:spLocks noGrp="1" noRot="1" noChangeAspect="1"/>
+          </p:cNvSpPr>
+          <p:nvPr>
+            <p:ph type="sldImg"/>
+          </p:nvPr>
+        </p:nvSpPr>
+        <p:spPr/>
+      </p:sp>
+      <p:sp>
+        <p:nvSpPr>
+          <p:cNvPr id="3" name="Notes Placeholder 2"/>
+          <p:cNvSpPr>
+            <a:spLocks noGrp="1"/>
+          </p:cNvSpPr>
+          <p:nvPr>
+            <p:ph type="body" idx="1"/>
+          </p:nvPr>
+        </p:nvSpPr>
+        <p:spPr/>
+        <p:txBody>
+          <a:bodyPr/>
+          <a:lstStyle/>
+          <a:p>
+            <a:pPr marL="0" marR="0" lvl="0" indent="0" algn="l" defTabSz="914400" rtl="0" eaLnBrk="1" fontAlgn="auto" latinLnBrk="0" hangingPunct="1">
+              <a:lnSpc>
+                <a:spcPct val="100000"/>
+              </a:lnSpc>
+              <a:spcBef>
+                <a:spcPts val="0"/>
+              </a:spcBef>
+              <a:spcAft>
+                <a:spcPts val="0"/>
+              </a:spcAft>
+              <a:buClrTx/>
+              <a:buSzTx/>
+              <a:buFontTx/>
+              <a:buNone/>
+              <a:tabLst/>
+              <a:defRPr/>
+            </a:pPr>
+            <a:r>
+              <a:rPr lang="pl-PL" dirty="0"/>
+              <a:t>Jeśli porównalibyśmy Javę do Scali to, Sekwencje Scali byłaby listą Javy, a </a:t>
+            </a:r>
+            <a:r>
+              <a:rPr lang="pl-PL" dirty="0" err="1"/>
+              <a:t>Scala's</a:t>
+            </a:r>
+            <a:r>
+              <a:rPr lang="pl-PL" dirty="0"/>
+              <a:t> List byłaby </a:t>
+            </a:r>
+            <a:r>
+              <a:rPr lang="pl-PL" dirty="0" err="1"/>
+              <a:t>Javowymi</a:t>
+            </a:r>
+            <a:r>
+              <a:rPr lang="pl-PL" dirty="0"/>
+              <a:t> </a:t>
+            </a:r>
+            <a:r>
+              <a:rPr lang="pl-PL" dirty="0" err="1"/>
+              <a:t>LinkedListami</a:t>
+            </a:r>
+            <a:r>
+              <a:rPr lang="pl-PL" dirty="0"/>
+              <a:t>.</a:t>
+            </a:r>
+            <a:br>
+              <a:rPr lang="pl-PL" dirty="0"/>
+            </a:br>
+            <a:r>
+              <a:rPr lang="pl-PL" dirty="0" err="1"/>
+              <a:t>Sequence</a:t>
+            </a:r>
+            <a:r>
+              <a:rPr lang="pl-PL" dirty="0"/>
+              <a:t> to </a:t>
+            </a:r>
+            <a:r>
+              <a:rPr lang="pl-PL" dirty="0" err="1"/>
+              <a:t>iterowalna</a:t>
+            </a:r>
+            <a:r>
+              <a:rPr lang="pl-PL" dirty="0"/>
+              <a:t> kolekcja klas </a:t>
+            </a:r>
+            <a:r>
+              <a:rPr lang="pl-PL" dirty="0" err="1"/>
+              <a:t>Iterable</a:t>
+            </a:r>
+            <a:r>
+              <a:rPr lang="pl-PL" dirty="0"/>
+              <a:t>. Służy do reprezentowania indeksowanych sekwencji, które mają określoną kolejność elementów, tj. Gwarantowaną niezmienność. Dostęp do elementów sekwencji można uzyskać za pomocą ich indeksów. Indeksy mieszczą się w zakresie od 0 do (n - 1) Gdzie, n = długość ciągu. Aby znaleźć </a:t>
+            </a:r>
+            <a:r>
+              <a:rPr lang="pl-PL" dirty="0" err="1"/>
+              <a:t>podsekwencje</a:t>
+            </a:r>
+            <a:r>
+              <a:rPr lang="pl-PL" dirty="0"/>
+              <a:t>, sekwencje obsługują różne metody. Metody takie jak </a:t>
+            </a:r>
+            <a:r>
+              <a:rPr lang="pl-PL" dirty="0" err="1"/>
+              <a:t>indexOf</a:t>
+            </a:r>
+            <a:r>
+              <a:rPr lang="pl-PL" dirty="0"/>
+              <a:t>, </a:t>
+            </a:r>
+            <a:r>
+              <a:rPr lang="pl-PL" dirty="0" err="1"/>
+              <a:t>segmentLength</a:t>
+            </a:r>
+            <a:r>
+              <a:rPr lang="pl-PL" dirty="0"/>
+              <a:t>, </a:t>
+            </a:r>
+            <a:r>
+              <a:rPr lang="pl-PL" dirty="0" err="1"/>
+              <a:t>prefixLength</a:t>
+            </a:r>
+            <a:r>
+              <a:rPr lang="pl-PL" dirty="0"/>
+              <a:t>, </a:t>
+            </a:r>
+            <a:r>
+              <a:rPr lang="pl-PL" dirty="0" err="1"/>
+              <a:t>lastIndexWhere</a:t>
+            </a:r>
+            <a:r>
+              <a:rPr lang="pl-PL" dirty="0"/>
+              <a:t>, </a:t>
+            </a:r>
+            <a:r>
+              <a:rPr lang="pl-PL" dirty="0" err="1"/>
+              <a:t>lastIndexOf</a:t>
+            </a:r>
+            <a:r>
+              <a:rPr lang="pl-PL" dirty="0"/>
+              <a:t>, </a:t>
+            </a:r>
+            <a:r>
+              <a:rPr lang="pl-PL" dirty="0" err="1"/>
+              <a:t>startedWith</a:t>
+            </a:r>
+            <a:r>
+              <a:rPr lang="pl-PL" dirty="0"/>
+              <a:t>, </a:t>
+            </a:r>
+            <a:r>
+              <a:rPr lang="pl-PL" dirty="0" err="1"/>
+              <a:t>endWith</a:t>
+            </a:r>
+            <a:r>
+              <a:rPr lang="pl-PL" dirty="0"/>
+              <a:t>. Istnieją dwie główne cechy podrzędne </a:t>
+            </a:r>
+            <a:r>
+              <a:rPr lang="pl-PL" dirty="0" err="1"/>
+              <a:t>Sequence</a:t>
+            </a:r>
+            <a:r>
+              <a:rPr lang="pl-PL" dirty="0"/>
+              <a:t>, mianowicie </a:t>
+            </a:r>
+            <a:r>
+              <a:rPr lang="pl-PL" dirty="0" err="1"/>
+              <a:t>IndexedSeq</a:t>
+            </a:r>
+            <a:r>
+              <a:rPr lang="pl-PL" dirty="0"/>
+              <a:t> i </a:t>
+            </a:r>
+            <a:r>
+              <a:rPr lang="pl-PL" dirty="0" err="1"/>
+              <a:t>LinearSeq</a:t>
+            </a:r>
+            <a:r>
+              <a:rPr lang="pl-PL" dirty="0"/>
+              <a:t>, które dają różne gwarancje wydajności. </a:t>
+            </a:r>
+            <a:r>
+              <a:rPr lang="pl-PL" dirty="0" err="1"/>
+              <a:t>IndexexedSeq</a:t>
+            </a:r>
+            <a:r>
+              <a:rPr lang="pl-PL" dirty="0"/>
+              <a:t> zapewnia szybki i swobodny dostęp do elementów, podczas gdy </a:t>
+            </a:r>
+            <a:r>
+              <a:rPr lang="pl-PL" dirty="0" err="1"/>
+              <a:t>LinearSeq</a:t>
+            </a:r>
+            <a:r>
+              <a:rPr lang="pl-PL" dirty="0"/>
+              <a:t> zapewnia szybki dostęp do pierwszego elementu tylko przez </a:t>
+            </a:r>
+            <a:r>
+              <a:rPr lang="pl-PL" dirty="0" err="1"/>
+              <a:t>head</a:t>
+            </a:r>
+            <a:r>
+              <a:rPr lang="pl-PL" dirty="0"/>
+              <a:t>, a także zawiera szybką operację </a:t>
+            </a:r>
+            <a:r>
+              <a:rPr lang="pl-PL" dirty="0" err="1"/>
+              <a:t>tail</a:t>
+            </a:r>
+            <a:r>
+              <a:rPr lang="pl-PL" dirty="0"/>
+              <a:t>.</a:t>
+            </a:r>
+          </a:p>
+          <a:p>
+            <a:pPr marL="0" marR="0" lvl="0" indent="0" algn="l" defTabSz="914400" rtl="0" eaLnBrk="1" fontAlgn="auto" latinLnBrk="0" hangingPunct="1">
+              <a:lnSpc>
+                <a:spcPct val="100000"/>
+              </a:lnSpc>
+              <a:spcBef>
+                <a:spcPts val="0"/>
+              </a:spcBef>
+              <a:spcAft>
+                <a:spcPts val="0"/>
+              </a:spcAft>
+              <a:buClrTx/>
+              <a:buSzTx/>
+              <a:buFontTx/>
+              <a:buNone/>
+              <a:tabLst/>
+              <a:defRPr/>
+            </a:pPr>
+            <a:endParaRPr lang="pl-PL" dirty="0"/>
+          </a:p>
+          <a:p>
+            <a:endParaRPr lang="pl-PL" dirty="0"/>
+          </a:p>
+        </p:txBody>
+      </p:sp>
+      <p:sp>
+        <p:nvSpPr>
+          <p:cNvPr id="4" name="Slide Number Placeholder 3"/>
+          <p:cNvSpPr>
+            <a:spLocks noGrp="1"/>
+          </p:cNvSpPr>
+          <p:nvPr>
+            <p:ph type="sldNum" sz="quarter" idx="5"/>
+          </p:nvPr>
+        </p:nvSpPr>
+        <p:spPr/>
+        <p:txBody>
+          <a:bodyPr/>
+          <a:lstStyle/>
+          <a:p>
+            <a:fld id="{6839968B-1966-479B-907B-2C4A53864213}" type="slidenum">
+              <a:rPr lang="pl-PL" smtClean="0"/>
+              <a:t>7</a:t>
+            </a:fld>
+            <a:endParaRPr lang="pl-PL"/>
+          </a:p>
+        </p:txBody>
+      </p:sp>
+    </p:spTree>
+    <p:extLst>
+      <p:ext uri="{BB962C8B-B14F-4D97-AF65-F5344CB8AC3E}">
+        <p14:creationId xmlns:p14="http://schemas.microsoft.com/office/powerpoint/2010/main" val="3240247795"/>
+      </p:ext>
+    </p:extLst>
+  </p:cSld>
+  <p:clrMapOvr>
+    <a:masterClrMapping/>
+  </p:clrMapOvr>
+</p:notes>
+</file>
+
 <file path=ppt/slideLayouts/slideLayout1.xml><?xml version="1.0" encoding="utf-8"?>
 <p:sldLayout xmlns:a="http://schemas.openxmlformats.org/drawingml/2006/main" xmlns:r="http://schemas.openxmlformats.org/officeDocument/2006/relationships" xmlns:p="http://schemas.openxmlformats.org/presentationml/2006/main" showMasterSp="0" type="title" preserve="1">
   <p:cSld name="Slajd tytułowy">
@@ -173,7 +1394,7 @@
           <a:noFill/>
           <a:extLst>
             <a:ext uri="{909E8E84-426E-40dd-AFC4-6F175D3DCCD1}">
-              <a14:hiddenFill xmlns="" xmlns:a14="http://schemas.microsoft.com/office/drawing/2010/main">
+              <a14:hiddenFill xmlns:a14="http://schemas.microsoft.com/office/drawing/2010/main" xmlns="">
                 <a:solidFill>
                   <a:srgbClr val="FFFFFF"/>
                 </a:solidFill>
@@ -233,7 +1454,7 @@
             </a:ln>
             <a:extLst>
               <a:ext uri="{91240B29-F687-4f45-9708-019B960494DF}">
-                <a14:hiddenLine xmlns="" xmlns:a14="http://schemas.microsoft.com/office/drawing/2010/main" w="9525">
+                <a14:hiddenLine xmlns:a14="http://schemas.microsoft.com/office/drawing/2010/main" xmlns="" w="9525">
                   <a:solidFill>
                     <a:srgbClr val="000000"/>
                   </a:solidFill>
@@ -323,7 +1544,7 @@
             </a:ln>
             <a:extLst>
               <a:ext uri="{91240B29-F687-4f45-9708-019B960494DF}">
-                <a14:hiddenLine xmlns="" xmlns:a14="http://schemas.microsoft.com/office/drawing/2010/main" w="9525">
+                <a14:hiddenLine xmlns:a14="http://schemas.microsoft.com/office/drawing/2010/main" xmlns="" w="9525">
                   <a:solidFill>
                     <a:srgbClr val="000000"/>
                   </a:solidFill>
@@ -413,7 +1634,7 @@
             </a:ln>
             <a:extLst>
               <a:ext uri="{91240B29-F687-4f45-9708-019B960494DF}">
-                <a14:hiddenLine xmlns="" xmlns:a14="http://schemas.microsoft.com/office/drawing/2010/main" w="9525">
+                <a14:hiddenLine xmlns:a14="http://schemas.microsoft.com/office/drawing/2010/main" xmlns="" w="9525">
                   <a:solidFill>
                     <a:srgbClr val="000000"/>
                   </a:solidFill>
@@ -447,7 +1668,7 @@
             </a:ln>
             <a:extLst>
               <a:ext uri="{91240B29-F687-4f45-9708-019B960494DF}">
-                <a14:hiddenLine xmlns="" xmlns:a14="http://schemas.microsoft.com/office/drawing/2010/main" w="9525">
+                <a14:hiddenLine xmlns:a14="http://schemas.microsoft.com/office/drawing/2010/main" xmlns="" w="9525">
                   <a:solidFill>
                     <a:srgbClr val="000000"/>
                   </a:solidFill>
@@ -537,7 +1758,7 @@
             </a:ln>
             <a:extLst>
               <a:ext uri="{91240B29-F687-4f45-9708-019B960494DF}">
-                <a14:hiddenLine xmlns="" xmlns:a14="http://schemas.microsoft.com/office/drawing/2010/main" w="9525">
+                <a14:hiddenLine xmlns:a14="http://schemas.microsoft.com/office/drawing/2010/main" xmlns="" w="9525">
                   <a:solidFill>
                     <a:srgbClr val="000000"/>
                   </a:solidFill>
@@ -599,7 +1820,7 @@
             </a:ln>
             <a:extLst>
               <a:ext uri="{91240B29-F687-4f45-9708-019B960494DF}">
-                <a14:hiddenLine xmlns="" xmlns:a14="http://schemas.microsoft.com/office/drawing/2010/main" w="9525">
+                <a14:hiddenLine xmlns:a14="http://schemas.microsoft.com/office/drawing/2010/main" xmlns="" w="9525">
                   <a:solidFill>
                     <a:srgbClr val="000000"/>
                   </a:solidFill>
@@ -661,7 +1882,7 @@
             </a:ln>
             <a:extLst>
               <a:ext uri="{91240B29-F687-4f45-9708-019B960494DF}">
-                <a14:hiddenLine xmlns="" xmlns:a14="http://schemas.microsoft.com/office/drawing/2010/main" w="9525">
+                <a14:hiddenLine xmlns:a14="http://schemas.microsoft.com/office/drawing/2010/main" xmlns="" w="9525">
                   <a:solidFill>
                     <a:srgbClr val="000000"/>
                   </a:solidFill>
@@ -751,7 +1972,7 @@
             </a:ln>
             <a:extLst>
               <a:ext uri="{91240B29-F687-4f45-9708-019B960494DF}">
-                <a14:hiddenLine xmlns="" xmlns:a14="http://schemas.microsoft.com/office/drawing/2010/main" w="9525">
+                <a14:hiddenLine xmlns:a14="http://schemas.microsoft.com/office/drawing/2010/main" xmlns="" w="9525">
                   <a:solidFill>
                     <a:srgbClr val="000000"/>
                   </a:solidFill>
@@ -813,7 +2034,7 @@
             </a:ln>
             <a:extLst>
               <a:ext uri="{91240B29-F687-4f45-9708-019B960494DF}">
-                <a14:hiddenLine xmlns="" xmlns:a14="http://schemas.microsoft.com/office/drawing/2010/main" w="9525">
+                <a14:hiddenLine xmlns:a14="http://schemas.microsoft.com/office/drawing/2010/main" xmlns="" w="9525">
                   <a:solidFill>
                     <a:srgbClr val="000000"/>
                   </a:solidFill>
@@ -875,7 +2096,7 @@
             </a:ln>
             <a:extLst>
               <a:ext uri="{91240B29-F687-4f45-9708-019B960494DF}">
-                <a14:hiddenLine xmlns="" xmlns:a14="http://schemas.microsoft.com/office/drawing/2010/main" w="9525">
+                <a14:hiddenLine xmlns:a14="http://schemas.microsoft.com/office/drawing/2010/main" xmlns="" w="9525">
                   <a:solidFill>
                     <a:srgbClr val="000000"/>
                   </a:solidFill>
@@ -965,7 +2186,7 @@
             </a:ln>
             <a:extLst>
               <a:ext uri="{91240B29-F687-4f45-9708-019B960494DF}">
-                <a14:hiddenLine xmlns="" xmlns:a14="http://schemas.microsoft.com/office/drawing/2010/main" w="9525">
+                <a14:hiddenLine xmlns:a14="http://schemas.microsoft.com/office/drawing/2010/main" xmlns="" w="9525">
                   <a:solidFill>
                     <a:srgbClr val="000000"/>
                   </a:solidFill>
@@ -1055,7 +2276,7 @@
             </a:ln>
             <a:extLst>
               <a:ext uri="{91240B29-F687-4f45-9708-019B960494DF}">
-                <a14:hiddenLine xmlns="" xmlns:a14="http://schemas.microsoft.com/office/drawing/2010/main" w="9525">
+                <a14:hiddenLine xmlns:a14="http://schemas.microsoft.com/office/drawing/2010/main" xmlns="" w="9525">
                   <a:solidFill>
                     <a:srgbClr val="000000"/>
                   </a:solidFill>
@@ -1117,7 +2338,7 @@
             </a:ln>
             <a:extLst>
               <a:ext uri="{91240B29-F687-4f45-9708-019B960494DF}">
-                <a14:hiddenLine xmlns="" xmlns:a14="http://schemas.microsoft.com/office/drawing/2010/main" w="9525">
+                <a14:hiddenLine xmlns:a14="http://schemas.microsoft.com/office/drawing/2010/main" xmlns="" w="9525">
                   <a:solidFill>
                     <a:srgbClr val="000000"/>
                   </a:solidFill>
@@ -1227,7 +2448,7 @@
             </a:ln>
             <a:extLst>
               <a:ext uri="{91240B29-F687-4f45-9708-019B960494DF}">
-                <a14:hiddenLine xmlns="" xmlns:a14="http://schemas.microsoft.com/office/drawing/2010/main" w="9525">
+                <a14:hiddenLine xmlns:a14="http://schemas.microsoft.com/office/drawing/2010/main" xmlns="" w="9525">
                   <a:solidFill>
                     <a:srgbClr val="000000"/>
                   </a:solidFill>
@@ -1289,7 +2510,7 @@
             </a:ln>
             <a:extLst>
               <a:ext uri="{91240B29-F687-4f45-9708-019B960494DF}">
-                <a14:hiddenLine xmlns="" xmlns:a14="http://schemas.microsoft.com/office/drawing/2010/main" w="9525">
+                <a14:hiddenLine xmlns:a14="http://schemas.microsoft.com/office/drawing/2010/main" xmlns="" w="9525">
                   <a:solidFill>
                     <a:srgbClr val="000000"/>
                   </a:solidFill>
@@ -1379,7 +2600,7 @@
             </a:ln>
             <a:extLst>
               <a:ext uri="{91240B29-F687-4f45-9708-019B960494DF}">
-                <a14:hiddenLine xmlns="" xmlns:a14="http://schemas.microsoft.com/office/drawing/2010/main" w="9525">
+                <a14:hiddenLine xmlns:a14="http://schemas.microsoft.com/office/drawing/2010/main" xmlns="" w="9525">
                   <a:solidFill>
                     <a:srgbClr val="000000"/>
                   </a:solidFill>
@@ -1469,7 +2690,7 @@
             </a:ln>
             <a:extLst>
               <a:ext uri="{91240B29-F687-4f45-9708-019B960494DF}">
-                <a14:hiddenLine xmlns="" xmlns:a14="http://schemas.microsoft.com/office/drawing/2010/main" w="9525">
+                <a14:hiddenLine xmlns:a14="http://schemas.microsoft.com/office/drawing/2010/main" xmlns="" w="9525">
                   <a:solidFill>
                     <a:srgbClr val="000000"/>
                   </a:solidFill>
@@ -1531,7 +2752,7 @@
             </a:ln>
             <a:extLst>
               <a:ext uri="{91240B29-F687-4f45-9708-019B960494DF}">
-                <a14:hiddenLine xmlns="" xmlns:a14="http://schemas.microsoft.com/office/drawing/2010/main" w="9525">
+                <a14:hiddenLine xmlns:a14="http://schemas.microsoft.com/office/drawing/2010/main" xmlns="" w="9525">
                   <a:solidFill>
                     <a:srgbClr val="000000"/>
                   </a:solidFill>
@@ -1621,7 +2842,7 @@
             </a:ln>
             <a:extLst>
               <a:ext uri="{91240B29-F687-4f45-9708-019B960494DF}">
-                <a14:hiddenLine xmlns="" xmlns:a14="http://schemas.microsoft.com/office/drawing/2010/main" w="9525">
+                <a14:hiddenLine xmlns:a14="http://schemas.microsoft.com/office/drawing/2010/main" xmlns="" w="9525">
                   <a:solidFill>
                     <a:srgbClr val="000000"/>
                   </a:solidFill>
@@ -1711,7 +2932,7 @@
             </a:ln>
             <a:extLst>
               <a:ext uri="{91240B29-F687-4f45-9708-019B960494DF}">
-                <a14:hiddenLine xmlns="" xmlns:a14="http://schemas.microsoft.com/office/drawing/2010/main" w="9525">
+                <a14:hiddenLine xmlns:a14="http://schemas.microsoft.com/office/drawing/2010/main" xmlns="" w="9525">
                   <a:solidFill>
                     <a:srgbClr val="000000"/>
                   </a:solidFill>
@@ -1767,7 +2988,7 @@
             </a:ln>
             <a:extLst>
               <a:ext uri="{91240B29-F687-4f45-9708-019B960494DF}">
-                <a14:hiddenLine xmlns="" xmlns:a14="http://schemas.microsoft.com/office/drawing/2010/main" w="9525">
+                <a14:hiddenLine xmlns:a14="http://schemas.microsoft.com/office/drawing/2010/main" xmlns="" w="9525">
                   <a:solidFill>
                     <a:srgbClr val="000000"/>
                   </a:solidFill>
@@ -1857,7 +3078,7 @@
             </a:ln>
             <a:extLst>
               <a:ext uri="{91240B29-F687-4f45-9708-019B960494DF}">
-                <a14:hiddenLine xmlns="" xmlns:a14="http://schemas.microsoft.com/office/drawing/2010/main" w="9525">
+                <a14:hiddenLine xmlns:a14="http://schemas.microsoft.com/office/drawing/2010/main" xmlns="" w="9525">
                   <a:solidFill>
                     <a:srgbClr val="000000"/>
                   </a:solidFill>
@@ -1913,7 +3134,7 @@
             </a:ln>
             <a:extLst>
               <a:ext uri="{91240B29-F687-4f45-9708-019B960494DF}">
-                <a14:hiddenLine xmlns="" xmlns:a14="http://schemas.microsoft.com/office/drawing/2010/main" w="9525">
+                <a14:hiddenLine xmlns:a14="http://schemas.microsoft.com/office/drawing/2010/main" xmlns="" w="9525">
                   <a:solidFill>
                     <a:srgbClr val="000000"/>
                   </a:solidFill>
@@ -2003,7 +3224,7 @@
             </a:ln>
             <a:extLst>
               <a:ext uri="{91240B29-F687-4f45-9708-019B960494DF}">
-                <a14:hiddenLine xmlns="" xmlns:a14="http://schemas.microsoft.com/office/drawing/2010/main" w="9525">
+                <a14:hiddenLine xmlns:a14="http://schemas.microsoft.com/office/drawing/2010/main" xmlns="" w="9525">
                   <a:solidFill>
                     <a:srgbClr val="000000"/>
                   </a:solidFill>
@@ -2071,7 +3292,7 @@
             </a:ln>
             <a:extLst>
               <a:ext uri="{91240B29-F687-4f45-9708-019B960494DF}">
-                <a14:hiddenLine xmlns="" xmlns:a14="http://schemas.microsoft.com/office/drawing/2010/main" w="9525">
+                <a14:hiddenLine xmlns:a14="http://schemas.microsoft.com/office/drawing/2010/main" xmlns="" w="9525">
                   <a:solidFill>
                     <a:srgbClr val="000000"/>
                   </a:solidFill>
@@ -2161,7 +3382,7 @@
             </a:ln>
             <a:extLst>
               <a:ext uri="{91240B29-F687-4f45-9708-019B960494DF}">
-                <a14:hiddenLine xmlns="" xmlns:a14="http://schemas.microsoft.com/office/drawing/2010/main" w="9525">
+                <a14:hiddenLine xmlns:a14="http://schemas.microsoft.com/office/drawing/2010/main" xmlns="" w="9525">
                   <a:solidFill>
                     <a:srgbClr val="000000"/>
                   </a:solidFill>
@@ -2229,7 +3450,7 @@
             </a:ln>
             <a:extLst>
               <a:ext uri="{91240B29-F687-4f45-9708-019B960494DF}">
-                <a14:hiddenLine xmlns="" xmlns:a14="http://schemas.microsoft.com/office/drawing/2010/main" w="9525">
+                <a14:hiddenLine xmlns:a14="http://schemas.microsoft.com/office/drawing/2010/main" xmlns="" w="9525">
                   <a:solidFill>
                     <a:srgbClr val="000000"/>
                   </a:solidFill>
@@ -2319,7 +3540,7 @@
             </a:ln>
             <a:extLst>
               <a:ext uri="{91240B29-F687-4f45-9708-019B960494DF}">
-                <a14:hiddenLine xmlns="" xmlns:a14="http://schemas.microsoft.com/office/drawing/2010/main" w="9525">
+                <a14:hiddenLine xmlns:a14="http://schemas.microsoft.com/office/drawing/2010/main" xmlns="" w="9525">
                   <a:solidFill>
                     <a:srgbClr val="000000"/>
                   </a:solidFill>
@@ -2353,7 +3574,7 @@
             </a:ln>
             <a:extLst>
               <a:ext uri="{91240B29-F687-4f45-9708-019B960494DF}">
-                <a14:hiddenLine xmlns="" xmlns:a14="http://schemas.microsoft.com/office/drawing/2010/main" w="9525">
+                <a14:hiddenLine xmlns:a14="http://schemas.microsoft.com/office/drawing/2010/main" xmlns="" w="9525">
                   <a:solidFill>
                     <a:srgbClr val="000000"/>
                   </a:solidFill>
@@ -2443,7 +3664,7 @@
             </a:ln>
             <a:extLst>
               <a:ext uri="{91240B29-F687-4f45-9708-019B960494DF}">
-                <a14:hiddenLine xmlns="" xmlns:a14="http://schemas.microsoft.com/office/drawing/2010/main" w="9525">
+                <a14:hiddenLine xmlns:a14="http://schemas.microsoft.com/office/drawing/2010/main" xmlns="" w="9525">
                   <a:solidFill>
                     <a:srgbClr val="000000"/>
                   </a:solidFill>
@@ -2505,7 +3726,7 @@
             </a:ln>
             <a:extLst>
               <a:ext uri="{91240B29-F687-4f45-9708-019B960494DF}">
-                <a14:hiddenLine xmlns="" xmlns:a14="http://schemas.microsoft.com/office/drawing/2010/main" w="9525">
+                <a14:hiddenLine xmlns:a14="http://schemas.microsoft.com/office/drawing/2010/main" xmlns="" w="9525">
                   <a:solidFill>
                     <a:srgbClr val="000000"/>
                   </a:solidFill>
@@ -2567,7 +3788,7 @@
             </a:ln>
             <a:extLst>
               <a:ext uri="{91240B29-F687-4f45-9708-019B960494DF}">
-                <a14:hiddenLine xmlns="" xmlns:a14="http://schemas.microsoft.com/office/drawing/2010/main" w="9525">
+                <a14:hiddenLine xmlns:a14="http://schemas.microsoft.com/office/drawing/2010/main" xmlns="" w="9525">
                   <a:solidFill>
                     <a:srgbClr val="000000"/>
                   </a:solidFill>
@@ -2657,7 +3878,7 @@
             </a:ln>
             <a:extLst>
               <a:ext uri="{91240B29-F687-4f45-9708-019B960494DF}">
-                <a14:hiddenLine xmlns="" xmlns:a14="http://schemas.microsoft.com/office/drawing/2010/main" w="9525">
+                <a14:hiddenLine xmlns:a14="http://schemas.microsoft.com/office/drawing/2010/main" xmlns="" w="9525">
                   <a:solidFill>
                     <a:srgbClr val="000000"/>
                   </a:solidFill>
@@ -2725,7 +3946,7 @@
             </a:ln>
             <a:extLst>
               <a:ext uri="{91240B29-F687-4f45-9708-019B960494DF}">
-                <a14:hiddenLine xmlns="" xmlns:a14="http://schemas.microsoft.com/office/drawing/2010/main" w="9525">
+                <a14:hiddenLine xmlns:a14="http://schemas.microsoft.com/office/drawing/2010/main" xmlns="" w="9525">
                   <a:solidFill>
                     <a:srgbClr val="000000"/>
                   </a:solidFill>
@@ -2787,7 +4008,7 @@
             </a:ln>
             <a:extLst>
               <a:ext uri="{91240B29-F687-4f45-9708-019B960494DF}">
-                <a14:hiddenLine xmlns="" xmlns:a14="http://schemas.microsoft.com/office/drawing/2010/main" w="9525">
+                <a14:hiddenLine xmlns:a14="http://schemas.microsoft.com/office/drawing/2010/main" xmlns="" w="9525">
                   <a:solidFill>
                     <a:srgbClr val="000000"/>
                   </a:solidFill>
@@ -2877,7 +4098,7 @@
             </a:ln>
             <a:extLst>
               <a:ext uri="{91240B29-F687-4f45-9708-019B960494DF}">
-                <a14:hiddenLine xmlns="" xmlns:a14="http://schemas.microsoft.com/office/drawing/2010/main" w="9525">
+                <a14:hiddenLine xmlns:a14="http://schemas.microsoft.com/office/drawing/2010/main" xmlns="" w="9525">
                   <a:solidFill>
                     <a:srgbClr val="000000"/>
                   </a:solidFill>
@@ -2939,7 +4160,7 @@
             </a:ln>
             <a:extLst>
               <a:ext uri="{91240B29-F687-4f45-9708-019B960494DF}">
-                <a14:hiddenLine xmlns="" xmlns:a14="http://schemas.microsoft.com/office/drawing/2010/main" w="9525">
+                <a14:hiddenLine xmlns:a14="http://schemas.microsoft.com/office/drawing/2010/main" xmlns="" w="9525">
                   <a:solidFill>
                     <a:srgbClr val="000000"/>
                   </a:solidFill>
@@ -3029,7 +4250,7 @@
             </a:ln>
             <a:extLst>
               <a:ext uri="{91240B29-F687-4f45-9708-019B960494DF}">
-                <a14:hiddenLine xmlns="" xmlns:a14="http://schemas.microsoft.com/office/drawing/2010/main" w="9525">
+                <a14:hiddenLine xmlns:a14="http://schemas.microsoft.com/office/drawing/2010/main" xmlns="" w="9525">
                   <a:solidFill>
                     <a:srgbClr val="000000"/>
                   </a:solidFill>
@@ -3091,7 +4312,7 @@
             </a:ln>
             <a:extLst>
               <a:ext uri="{91240B29-F687-4f45-9708-019B960494DF}">
-                <a14:hiddenLine xmlns="" xmlns:a14="http://schemas.microsoft.com/office/drawing/2010/main" w="9525">
+                <a14:hiddenLine xmlns:a14="http://schemas.microsoft.com/office/drawing/2010/main" xmlns="" w="9525">
                   <a:solidFill>
                     <a:srgbClr val="000000"/>
                   </a:solidFill>
@@ -3181,7 +4402,7 @@
             </a:ln>
             <a:extLst>
               <a:ext uri="{91240B29-F687-4f45-9708-019B960494DF}">
-                <a14:hiddenLine xmlns="" xmlns:a14="http://schemas.microsoft.com/office/drawing/2010/main" w="9525">
+                <a14:hiddenLine xmlns:a14="http://schemas.microsoft.com/office/drawing/2010/main" xmlns="" w="9525">
                   <a:solidFill>
                     <a:srgbClr val="000000"/>
                   </a:solidFill>
@@ -3215,7 +4436,7 @@
             </a:ln>
             <a:extLst>
               <a:ext uri="{91240B29-F687-4f45-9708-019B960494DF}">
-                <a14:hiddenLine xmlns="" xmlns:a14="http://schemas.microsoft.com/office/drawing/2010/main" w="9525">
+                <a14:hiddenLine xmlns:a14="http://schemas.microsoft.com/office/drawing/2010/main" xmlns="" w="9525">
                   <a:solidFill>
                     <a:srgbClr val="000000"/>
                   </a:solidFill>
@@ -3280,7 +4501,7 @@
             </a:ln>
             <a:extLst>
               <a:ext uri="{91240B29-F687-4f45-9708-019B960494DF}">
-                <a14:hiddenLine xmlns="" xmlns:a14="http://schemas.microsoft.com/office/drawing/2010/main" w="9525">
+                <a14:hiddenLine xmlns:a14="http://schemas.microsoft.com/office/drawing/2010/main" xmlns="" w="9525">
                   <a:solidFill>
                     <a:srgbClr val="000000"/>
                   </a:solidFill>
@@ -3370,7 +4591,7 @@
             </a:ln>
             <a:extLst>
               <a:ext uri="{91240B29-F687-4f45-9708-019B960494DF}">
-                <a14:hiddenLine xmlns="" xmlns:a14="http://schemas.microsoft.com/office/drawing/2010/main" w="9525">
+                <a14:hiddenLine xmlns:a14="http://schemas.microsoft.com/office/drawing/2010/main" xmlns="" w="9525">
                   <a:solidFill>
                     <a:srgbClr val="000000"/>
                   </a:solidFill>
@@ -3432,7 +4653,7 @@
             </a:ln>
             <a:extLst>
               <a:ext uri="{91240B29-F687-4f45-9708-019B960494DF}">
-                <a14:hiddenLine xmlns="" xmlns:a14="http://schemas.microsoft.com/office/drawing/2010/main" w="9525">
+                <a14:hiddenLine xmlns:a14="http://schemas.microsoft.com/office/drawing/2010/main" xmlns="" w="9525">
                   <a:solidFill>
                     <a:srgbClr val="000000"/>
                   </a:solidFill>
@@ -3522,7 +4743,7 @@
             </a:ln>
             <a:extLst>
               <a:ext uri="{91240B29-F687-4f45-9708-019B960494DF}">
-                <a14:hiddenLine xmlns="" xmlns:a14="http://schemas.microsoft.com/office/drawing/2010/main" w="9525">
+                <a14:hiddenLine xmlns:a14="http://schemas.microsoft.com/office/drawing/2010/main" xmlns="" w="9525">
                   <a:solidFill>
                     <a:srgbClr val="000000"/>
                   </a:solidFill>
@@ -3612,7 +4833,7 @@
             </a:ln>
             <a:extLst>
               <a:ext uri="{91240B29-F687-4f45-9708-019B960494DF}">
-                <a14:hiddenLine xmlns="" xmlns:a14="http://schemas.microsoft.com/office/drawing/2010/main" w="9525">
+                <a14:hiddenLine xmlns:a14="http://schemas.microsoft.com/office/drawing/2010/main" xmlns="" w="9525">
                   <a:solidFill>
                     <a:srgbClr val="000000"/>
                   </a:solidFill>
@@ -3677,7 +4898,7 @@
             </a:ln>
             <a:extLst>
               <a:ext uri="{91240B29-F687-4f45-9708-019B960494DF}">
-                <a14:hiddenLine xmlns="" xmlns:a14="http://schemas.microsoft.com/office/drawing/2010/main" w="9525">
+                <a14:hiddenLine xmlns:a14="http://schemas.microsoft.com/office/drawing/2010/main" xmlns="" w="9525">
                   <a:solidFill>
                     <a:srgbClr val="000000"/>
                   </a:solidFill>
@@ -3739,7 +4960,7 @@
             </a:ln>
             <a:extLst>
               <a:ext uri="{91240B29-F687-4f45-9708-019B960494DF}">
-                <a14:hiddenLine xmlns="" xmlns:a14="http://schemas.microsoft.com/office/drawing/2010/main" w="9525">
+                <a14:hiddenLine xmlns:a14="http://schemas.microsoft.com/office/drawing/2010/main" xmlns="" w="9525">
                   <a:solidFill>
                     <a:srgbClr val="000000"/>
                   </a:solidFill>
@@ -3829,7 +5050,7 @@
             </a:ln>
             <a:extLst>
               <a:ext uri="{91240B29-F687-4f45-9708-019B960494DF}">
-                <a14:hiddenLine xmlns="" xmlns:a14="http://schemas.microsoft.com/office/drawing/2010/main" w="9525">
+                <a14:hiddenLine xmlns:a14="http://schemas.microsoft.com/office/drawing/2010/main" xmlns="" w="9525">
                   <a:solidFill>
                     <a:srgbClr val="000000"/>
                   </a:solidFill>
@@ -3919,7 +5140,7 @@
             </a:ln>
             <a:extLst>
               <a:ext uri="{91240B29-F687-4f45-9708-019B960494DF}">
-                <a14:hiddenLine xmlns="" xmlns:a14="http://schemas.microsoft.com/office/drawing/2010/main" w="9525">
+                <a14:hiddenLine xmlns:a14="http://schemas.microsoft.com/office/drawing/2010/main" xmlns="" w="9525">
                   <a:solidFill>
                     <a:srgbClr val="000000"/>
                   </a:solidFill>
@@ -3981,7 +5202,7 @@
             </a:ln>
             <a:extLst>
               <a:ext uri="{91240B29-F687-4f45-9708-019B960494DF}">
-                <a14:hiddenLine xmlns="" xmlns:a14="http://schemas.microsoft.com/office/drawing/2010/main" w="9525">
+                <a14:hiddenLine xmlns:a14="http://schemas.microsoft.com/office/drawing/2010/main" xmlns="" w="9525">
                   <a:solidFill>
                     <a:srgbClr val="000000"/>
                   </a:solidFill>
@@ -4101,7 +5322,7 @@
             </a:ln>
             <a:extLst>
               <a:ext uri="{91240B29-F687-4f45-9708-019B960494DF}">
-                <a14:hiddenLine xmlns="" xmlns:a14="http://schemas.microsoft.com/office/drawing/2010/main" w="9525">
+                <a14:hiddenLine xmlns:a14="http://schemas.microsoft.com/office/drawing/2010/main" xmlns="" w="9525">
                   <a:solidFill>
                     <a:srgbClr val="000000"/>
                   </a:solidFill>
@@ -4169,7 +5390,7 @@
             </a:ln>
             <a:extLst>
               <a:ext uri="{91240B29-F687-4f45-9708-019B960494DF}">
-                <a14:hiddenLine xmlns="" xmlns:a14="http://schemas.microsoft.com/office/drawing/2010/main" w="9525">
+                <a14:hiddenLine xmlns:a14="http://schemas.microsoft.com/office/drawing/2010/main" xmlns="" w="9525">
                   <a:solidFill>
                     <a:srgbClr val="000000"/>
                   </a:solidFill>
@@ -4259,7 +5480,7 @@
             </a:ln>
             <a:extLst>
               <a:ext uri="{91240B29-F687-4f45-9708-019B960494DF}">
-                <a14:hiddenLine xmlns="" xmlns:a14="http://schemas.microsoft.com/office/drawing/2010/main" w="9525">
+                <a14:hiddenLine xmlns:a14="http://schemas.microsoft.com/office/drawing/2010/main" xmlns="" w="9525">
                   <a:solidFill>
                     <a:srgbClr val="000000"/>
                   </a:solidFill>
@@ -4399,7 +5620,7 @@
           <a:p>
             <a:fld id="{48A87A34-81AB-432B-8DAE-1953F412C126}" type="datetimeFigureOut">
               <a:rPr lang="en-US" dirty="0"/>
-              <a:t>3/26/2021</a:t>
+              <a:t>3/29/2021</a:t>
             </a:fld>
             <a:endParaRPr lang="en-US" dirty="0"/>
           </a:p>
@@ -4661,7 +5882,7 @@
           <a:p>
             <a:fld id="{48A87A34-81AB-432B-8DAE-1953F412C126}" type="datetimeFigureOut">
               <a:rPr lang="en-US" dirty="0"/>
-              <a:t>3/26/2021</a:t>
+              <a:t>3/29/2021</a:t>
             </a:fld>
             <a:endParaRPr lang="en-US" dirty="0"/>
           </a:p>
@@ -4852,7 +6073,7 @@
           <a:p>
             <a:fld id="{48A87A34-81AB-432B-8DAE-1953F412C126}" type="datetimeFigureOut">
               <a:rPr lang="en-US" dirty="0"/>
-              <a:t>3/26/2021</a:t>
+              <a:t>3/29/2021</a:t>
             </a:fld>
             <a:endParaRPr lang="en-US" dirty="0"/>
           </a:p>
@@ -5110,7 +6331,7 @@
           <a:p>
             <a:fld id="{48A87A34-81AB-432B-8DAE-1953F412C126}" type="datetimeFigureOut">
               <a:rPr lang="en-US" dirty="0"/>
-              <a:t>3/26/2021</a:t>
+              <a:t>3/29/2021</a:t>
             </a:fld>
             <a:endParaRPr lang="en-US" dirty="0"/>
           </a:p>
@@ -5539,7 +6760,7 @@
           <a:p>
             <a:fld id="{48A87A34-81AB-432B-8DAE-1953F412C126}" type="datetimeFigureOut">
               <a:rPr lang="en-US" dirty="0"/>
-              <a:t>3/26/2021</a:t>
+              <a:t>3/29/2021</a:t>
             </a:fld>
             <a:endParaRPr lang="en-US" dirty="0"/>
           </a:p>
@@ -6080,7 +7301,7 @@
           <a:p>
             <a:fld id="{48A87A34-81AB-432B-8DAE-1953F412C126}" type="datetimeFigureOut">
               <a:rPr lang="en-US" dirty="0"/>
-              <a:t>3/26/2021</a:t>
+              <a:t>3/29/2021</a:t>
             </a:fld>
             <a:endParaRPr lang="en-US" dirty="0"/>
           </a:p>
@@ -6795,7 +8016,7 @@
           <a:p>
             <a:fld id="{48A87A34-81AB-432B-8DAE-1953F412C126}" type="datetimeFigureOut">
               <a:rPr lang="en-US" dirty="0"/>
-              <a:t>3/26/2021</a:t>
+              <a:t>3/29/2021</a:t>
             </a:fld>
             <a:endParaRPr lang="en-US" dirty="0"/>
           </a:p>
@@ -6960,7 +8181,7 @@
           <a:p>
             <a:fld id="{48A87A34-81AB-432B-8DAE-1953F412C126}" type="datetimeFigureOut">
               <a:rPr lang="en-US" dirty="0"/>
-              <a:t>3/26/2021</a:t>
+              <a:t>3/29/2021</a:t>
             </a:fld>
             <a:endParaRPr lang="en-US" dirty="0"/>
           </a:p>
@@ -7135,7 +8356,7 @@
           <a:p>
             <a:fld id="{48A87A34-81AB-432B-8DAE-1953F412C126}" type="datetimeFigureOut">
               <a:rPr lang="en-US" dirty="0"/>
-              <a:t>3/26/2021</a:t>
+              <a:t>3/29/2021</a:t>
             </a:fld>
             <a:endParaRPr lang="en-US" dirty="0"/>
           </a:p>
@@ -7300,7 +8521,7 @@
           <a:p>
             <a:fld id="{48A87A34-81AB-432B-8DAE-1953F412C126}" type="datetimeFigureOut">
               <a:rPr lang="en-US" dirty="0"/>
-              <a:t>3/26/2021</a:t>
+              <a:t>3/29/2021</a:t>
             </a:fld>
             <a:endParaRPr lang="en-US" dirty="0"/>
           </a:p>
@@ -7545,7 +8766,7 @@
           <a:p>
             <a:fld id="{48A87A34-81AB-432B-8DAE-1953F412C126}" type="datetimeFigureOut">
               <a:rPr lang="en-US" dirty="0"/>
-              <a:t>3/26/2021</a:t>
+              <a:t>3/29/2021</a:t>
             </a:fld>
             <a:endParaRPr lang="en-US" dirty="0"/>
           </a:p>
@@ -7772,7 +8993,7 @@
           <a:p>
             <a:fld id="{48A87A34-81AB-432B-8DAE-1953F412C126}" type="datetimeFigureOut">
               <a:rPr lang="en-US" dirty="0"/>
-              <a:t>3/26/2021</a:t>
+              <a:t>3/29/2021</a:t>
             </a:fld>
             <a:endParaRPr lang="en-US" dirty="0"/>
           </a:p>
@@ -8148,7 +9369,7 @@
           <a:p>
             <a:fld id="{48A87A34-81AB-432B-8DAE-1953F412C126}" type="datetimeFigureOut">
               <a:rPr lang="en-US" dirty="0"/>
-              <a:t>3/26/2021</a:t>
+              <a:t>3/29/2021</a:t>
             </a:fld>
             <a:endParaRPr lang="en-US" dirty="0"/>
           </a:p>
@@ -8261,7 +9482,7 @@
           <a:p>
             <a:fld id="{48A87A34-81AB-432B-8DAE-1953F412C126}" type="datetimeFigureOut">
               <a:rPr lang="en-US" dirty="0"/>
-              <a:t>3/26/2021</a:t>
+              <a:t>3/29/2021</a:t>
             </a:fld>
             <a:endParaRPr lang="en-US" dirty="0"/>
           </a:p>
@@ -8351,7 +9572,7 @@
           <a:p>
             <a:fld id="{48A87A34-81AB-432B-8DAE-1953F412C126}" type="datetimeFigureOut">
               <a:rPr lang="en-US" dirty="0"/>
-              <a:t>3/26/2021</a:t>
+              <a:t>3/29/2021</a:t>
             </a:fld>
             <a:endParaRPr lang="en-US" dirty="0"/>
           </a:p>
@@ -8595,7 +9816,7 @@
           <a:p>
             <a:fld id="{48A87A34-81AB-432B-8DAE-1953F412C126}" type="datetimeFigureOut">
               <a:rPr lang="en-US" dirty="0"/>
-              <a:t>3/26/2021</a:t>
+              <a:t>3/29/2021</a:t>
             </a:fld>
             <a:endParaRPr lang="en-US" dirty="0"/>
           </a:p>
@@ -8870,7 +10091,7 @@
           <a:p>
             <a:fld id="{48A87A34-81AB-432B-8DAE-1953F412C126}" type="datetimeFigureOut">
               <a:rPr lang="en-US" dirty="0"/>
-              <a:t>3/26/2021</a:t>
+              <a:t>3/29/2021</a:t>
             </a:fld>
             <a:endParaRPr lang="en-US" dirty="0"/>
           </a:p>
@@ -8981,7 +10202,7 @@
           <a:noFill/>
           <a:extLst>
             <a:ext uri="{909E8E84-426E-40dd-AFC4-6F175D3DCCD1}">
-              <a14:hiddenFill xmlns="" xmlns:a14="http://schemas.microsoft.com/office/drawing/2010/main">
+              <a14:hiddenFill xmlns:a14="http://schemas.microsoft.com/office/drawing/2010/main" xmlns="">
                 <a:solidFill>
                   <a:srgbClr val="FFFFFF"/>
                 </a:solidFill>
@@ -9055,7 +10276,7 @@
               </a:ln>
               <a:extLst>
                 <a:ext uri="{91240B29-F687-4f45-9708-019B960494DF}">
-                  <a14:hiddenLine xmlns="" xmlns:a14="http://schemas.microsoft.com/office/drawing/2010/main" w="9525">
+                  <a14:hiddenLine xmlns:a14="http://schemas.microsoft.com/office/drawing/2010/main" xmlns="" w="9525">
                     <a:solidFill>
                       <a:srgbClr val="000000"/>
                     </a:solidFill>
@@ -9145,7 +10366,7 @@
               </a:ln>
               <a:extLst>
                 <a:ext uri="{91240B29-F687-4f45-9708-019B960494DF}">
-                  <a14:hiddenLine xmlns="" xmlns:a14="http://schemas.microsoft.com/office/drawing/2010/main" w="9525">
+                  <a14:hiddenLine xmlns:a14="http://schemas.microsoft.com/office/drawing/2010/main" xmlns="" w="9525">
                     <a:solidFill>
                       <a:srgbClr val="000000"/>
                     </a:solidFill>
@@ -9235,7 +10456,7 @@
               </a:ln>
               <a:extLst>
                 <a:ext uri="{91240B29-F687-4f45-9708-019B960494DF}">
-                  <a14:hiddenLine xmlns="" xmlns:a14="http://schemas.microsoft.com/office/drawing/2010/main" w="9525">
+                  <a14:hiddenLine xmlns:a14="http://schemas.microsoft.com/office/drawing/2010/main" xmlns="" w="9525">
                     <a:solidFill>
                       <a:srgbClr val="000000"/>
                     </a:solidFill>
@@ -9297,7 +10518,7 @@
               </a:ln>
               <a:extLst>
                 <a:ext uri="{91240B29-F687-4f45-9708-019B960494DF}">
-                  <a14:hiddenLine xmlns="" xmlns:a14="http://schemas.microsoft.com/office/drawing/2010/main" w="9525">
+                  <a14:hiddenLine xmlns:a14="http://schemas.microsoft.com/office/drawing/2010/main" xmlns="" w="9525">
                     <a:solidFill>
                       <a:srgbClr val="000000"/>
                     </a:solidFill>
@@ -9387,7 +10608,7 @@
               </a:ln>
               <a:extLst>
                 <a:ext uri="{91240B29-F687-4f45-9708-019B960494DF}">
-                  <a14:hiddenLine xmlns="" xmlns:a14="http://schemas.microsoft.com/office/drawing/2010/main" w="9525">
+                  <a14:hiddenLine xmlns:a14="http://schemas.microsoft.com/office/drawing/2010/main" xmlns="" w="9525">
                     <a:solidFill>
                       <a:srgbClr val="000000"/>
                     </a:solidFill>
@@ -9449,7 +10670,7 @@
               </a:ln>
               <a:extLst>
                 <a:ext uri="{91240B29-F687-4f45-9708-019B960494DF}">
-                  <a14:hiddenLine xmlns="" xmlns:a14="http://schemas.microsoft.com/office/drawing/2010/main" w="9525">
+                  <a14:hiddenLine xmlns:a14="http://schemas.microsoft.com/office/drawing/2010/main" xmlns="" w="9525">
                     <a:solidFill>
                       <a:srgbClr val="000000"/>
                     </a:solidFill>
@@ -9511,7 +10732,7 @@
               </a:ln>
               <a:extLst>
                 <a:ext uri="{91240B29-F687-4f45-9708-019B960494DF}">
-                  <a14:hiddenLine xmlns="" xmlns:a14="http://schemas.microsoft.com/office/drawing/2010/main" w="9525">
+                  <a14:hiddenLine xmlns:a14="http://schemas.microsoft.com/office/drawing/2010/main" xmlns="" w="9525">
                     <a:solidFill>
                       <a:srgbClr val="000000"/>
                     </a:solidFill>
@@ -9601,7 +10822,7 @@
               </a:ln>
               <a:extLst>
                 <a:ext uri="{91240B29-F687-4f45-9708-019B960494DF}">
-                  <a14:hiddenLine xmlns="" xmlns:a14="http://schemas.microsoft.com/office/drawing/2010/main" w="9525">
+                  <a14:hiddenLine xmlns:a14="http://schemas.microsoft.com/office/drawing/2010/main" xmlns="" w="9525">
                     <a:solidFill>
                       <a:srgbClr val="000000"/>
                     </a:solidFill>
@@ -9691,7 +10912,7 @@
               </a:ln>
               <a:extLst>
                 <a:ext uri="{91240B29-F687-4f45-9708-019B960494DF}">
-                  <a14:hiddenLine xmlns="" xmlns:a14="http://schemas.microsoft.com/office/drawing/2010/main" w="9525">
+                  <a14:hiddenLine xmlns:a14="http://schemas.microsoft.com/office/drawing/2010/main" xmlns="" w="9525">
                     <a:solidFill>
                       <a:srgbClr val="000000"/>
                     </a:solidFill>
@@ -9753,7 +10974,7 @@
               </a:ln>
               <a:extLst>
                 <a:ext uri="{91240B29-F687-4f45-9708-019B960494DF}">
-                  <a14:hiddenLine xmlns="" xmlns:a14="http://schemas.microsoft.com/office/drawing/2010/main" w="9525">
+                  <a14:hiddenLine xmlns:a14="http://schemas.microsoft.com/office/drawing/2010/main" xmlns="" w="9525">
                     <a:solidFill>
                       <a:srgbClr val="000000"/>
                     </a:solidFill>
@@ -9863,7 +11084,7 @@
               </a:ln>
               <a:extLst>
                 <a:ext uri="{91240B29-F687-4f45-9708-019B960494DF}">
-                  <a14:hiddenLine xmlns="" xmlns:a14="http://schemas.microsoft.com/office/drawing/2010/main" w="9525">
+                  <a14:hiddenLine xmlns:a14="http://schemas.microsoft.com/office/drawing/2010/main" xmlns="" w="9525">
                     <a:solidFill>
                       <a:srgbClr val="000000"/>
                     </a:solidFill>
@@ -9947,7 +11168,7 @@
               </a:ln>
               <a:extLst>
                 <a:ext uri="{91240B29-F687-4f45-9708-019B960494DF}">
-                  <a14:hiddenLine xmlns="" xmlns:a14="http://schemas.microsoft.com/office/drawing/2010/main" w="9525">
+                  <a14:hiddenLine xmlns:a14="http://schemas.microsoft.com/office/drawing/2010/main" xmlns="" w="9525">
                     <a:solidFill>
                       <a:srgbClr val="000000"/>
                     </a:solidFill>
@@ -10009,7 +11230,7 @@
               </a:ln>
               <a:extLst>
                 <a:ext uri="{91240B29-F687-4f45-9708-019B960494DF}">
-                  <a14:hiddenLine xmlns="" xmlns:a14="http://schemas.microsoft.com/office/drawing/2010/main" w="9525">
+                  <a14:hiddenLine xmlns:a14="http://schemas.microsoft.com/office/drawing/2010/main" xmlns="" w="9525">
                     <a:solidFill>
                       <a:srgbClr val="000000"/>
                     </a:solidFill>
@@ -10071,7 +11292,7 @@
               </a:ln>
               <a:extLst>
                 <a:ext uri="{91240B29-F687-4f45-9708-019B960494DF}">
-                  <a14:hiddenLine xmlns="" xmlns:a14="http://schemas.microsoft.com/office/drawing/2010/main" w="9525">
+                  <a14:hiddenLine xmlns:a14="http://schemas.microsoft.com/office/drawing/2010/main" xmlns="" w="9525">
                     <a:solidFill>
                       <a:srgbClr val="000000"/>
                     </a:solidFill>
@@ -10161,7 +11382,7 @@
               </a:ln>
               <a:extLst>
                 <a:ext uri="{91240B29-F687-4f45-9708-019B960494DF}">
-                  <a14:hiddenLine xmlns="" xmlns:a14="http://schemas.microsoft.com/office/drawing/2010/main" w="9525">
+                  <a14:hiddenLine xmlns:a14="http://schemas.microsoft.com/office/drawing/2010/main" xmlns="" w="9525">
                     <a:solidFill>
                       <a:srgbClr val="000000"/>
                     </a:solidFill>
@@ -10195,7 +11416,7 @@
               </a:ln>
               <a:extLst>
                 <a:ext uri="{91240B29-F687-4f45-9708-019B960494DF}">
-                  <a14:hiddenLine xmlns="" xmlns:a14="http://schemas.microsoft.com/office/drawing/2010/main" w="9525">
+                  <a14:hiddenLine xmlns:a14="http://schemas.microsoft.com/office/drawing/2010/main" xmlns="" w="9525">
                     <a:solidFill>
                       <a:srgbClr val="000000"/>
                     </a:solidFill>
@@ -10260,7 +11481,7 @@
               </a:ln>
               <a:extLst>
                 <a:ext uri="{91240B29-F687-4f45-9708-019B960494DF}">
-                  <a14:hiddenLine xmlns="" xmlns:a14="http://schemas.microsoft.com/office/drawing/2010/main" w="9525">
+                  <a14:hiddenLine xmlns:a14="http://schemas.microsoft.com/office/drawing/2010/main" xmlns="" w="9525">
                     <a:solidFill>
                       <a:srgbClr val="000000"/>
                     </a:solidFill>
@@ -10350,7 +11571,7 @@
               </a:ln>
               <a:extLst>
                 <a:ext uri="{91240B29-F687-4f45-9708-019B960494DF}">
-                  <a14:hiddenLine xmlns="" xmlns:a14="http://schemas.microsoft.com/office/drawing/2010/main" w="9525">
+                  <a14:hiddenLine xmlns:a14="http://schemas.microsoft.com/office/drawing/2010/main" xmlns="" w="9525">
                     <a:solidFill>
                       <a:srgbClr val="000000"/>
                     </a:solidFill>
@@ -10412,7 +11633,7 @@
               </a:ln>
               <a:extLst>
                 <a:ext uri="{91240B29-F687-4f45-9708-019B960494DF}">
-                  <a14:hiddenLine xmlns="" xmlns:a14="http://schemas.microsoft.com/office/drawing/2010/main" w="9525">
+                  <a14:hiddenLine xmlns:a14="http://schemas.microsoft.com/office/drawing/2010/main" xmlns="" w="9525">
                     <a:solidFill>
                       <a:srgbClr val="000000"/>
                     </a:solidFill>
@@ -10502,7 +11723,7 @@
               </a:ln>
               <a:extLst>
                 <a:ext uri="{91240B29-F687-4f45-9708-019B960494DF}">
-                  <a14:hiddenLine xmlns="" xmlns:a14="http://schemas.microsoft.com/office/drawing/2010/main" w="9525">
+                  <a14:hiddenLine xmlns:a14="http://schemas.microsoft.com/office/drawing/2010/main" xmlns="" w="9525">
                     <a:solidFill>
                       <a:srgbClr val="000000"/>
                     </a:solidFill>
@@ -10567,7 +11788,7 @@
               </a:ln>
               <a:extLst>
                 <a:ext uri="{91240B29-F687-4f45-9708-019B960494DF}">
-                  <a14:hiddenLine xmlns="" xmlns:a14="http://schemas.microsoft.com/office/drawing/2010/main" w="9525">
+                  <a14:hiddenLine xmlns:a14="http://schemas.microsoft.com/office/drawing/2010/main" xmlns="" w="9525">
                     <a:solidFill>
                       <a:srgbClr val="000000"/>
                     </a:solidFill>
@@ -10629,7 +11850,7 @@
               </a:ln>
               <a:extLst>
                 <a:ext uri="{91240B29-F687-4f45-9708-019B960494DF}">
-                  <a14:hiddenLine xmlns="" xmlns:a14="http://schemas.microsoft.com/office/drawing/2010/main" w="9525">
+                  <a14:hiddenLine xmlns:a14="http://schemas.microsoft.com/office/drawing/2010/main" xmlns="" w="9525">
                     <a:solidFill>
                       <a:srgbClr val="000000"/>
                     </a:solidFill>
@@ -10719,7 +11940,7 @@
               </a:ln>
               <a:extLst>
                 <a:ext uri="{91240B29-F687-4f45-9708-019B960494DF}">
-                  <a14:hiddenLine xmlns="" xmlns:a14="http://schemas.microsoft.com/office/drawing/2010/main" w="9525">
+                  <a14:hiddenLine xmlns:a14="http://schemas.microsoft.com/office/drawing/2010/main" xmlns="" w="9525">
                     <a:solidFill>
                       <a:srgbClr val="000000"/>
                     </a:solidFill>
@@ -10809,7 +12030,7 @@
               </a:ln>
               <a:extLst>
                 <a:ext uri="{91240B29-F687-4f45-9708-019B960494DF}">
-                  <a14:hiddenLine xmlns="" xmlns:a14="http://schemas.microsoft.com/office/drawing/2010/main" w="9525">
+                  <a14:hiddenLine xmlns:a14="http://schemas.microsoft.com/office/drawing/2010/main" xmlns="" w="9525">
                     <a:solidFill>
                       <a:srgbClr val="000000"/>
                     </a:solidFill>
@@ -10874,7 +12095,7 @@
               </a:ln>
               <a:extLst>
                 <a:ext uri="{91240B29-F687-4f45-9708-019B960494DF}">
-                  <a14:hiddenLine xmlns="" xmlns:a14="http://schemas.microsoft.com/office/drawing/2010/main" w="9525">
+                  <a14:hiddenLine xmlns:a14="http://schemas.microsoft.com/office/drawing/2010/main" xmlns="" w="9525">
                     <a:solidFill>
                       <a:srgbClr val="000000"/>
                     </a:solidFill>
@@ -10994,7 +12215,7 @@
               </a:ln>
               <a:extLst>
                 <a:ext uri="{91240B29-F687-4f45-9708-019B960494DF}">
-                  <a14:hiddenLine xmlns="" xmlns:a14="http://schemas.microsoft.com/office/drawing/2010/main" w="9525">
+                  <a14:hiddenLine xmlns:a14="http://schemas.microsoft.com/office/drawing/2010/main" xmlns="" w="9525">
                     <a:solidFill>
                       <a:srgbClr val="000000"/>
                     </a:solidFill>
@@ -11092,7 +12313,7 @@
               </a:ln>
               <a:extLst>
                 <a:ext uri="{91240B29-F687-4f45-9708-019B960494DF}">
-                  <a14:hiddenLine xmlns="" xmlns:a14="http://schemas.microsoft.com/office/drawing/2010/main" w="9525">
+                  <a14:hiddenLine xmlns:a14="http://schemas.microsoft.com/office/drawing/2010/main" xmlns="" w="9525">
                     <a:solidFill>
                       <a:srgbClr val="000000"/>
                     </a:solidFill>
@@ -11207,7 +12428,7 @@
               </a:ln>
               <a:extLst>
                 <a:ext uri="{91240B29-F687-4f45-9708-019B960494DF}">
-                  <a14:hiddenLine xmlns="" xmlns:a14="http://schemas.microsoft.com/office/drawing/2010/main" w="9525">
+                  <a14:hiddenLine xmlns:a14="http://schemas.microsoft.com/office/drawing/2010/main" xmlns="" w="9525">
                     <a:solidFill>
                       <a:srgbClr val="000000"/>
                     </a:solidFill>
@@ -11297,7 +12518,7 @@
               </a:ln>
               <a:extLst>
                 <a:ext uri="{91240B29-F687-4f45-9708-019B960494DF}">
-                  <a14:hiddenLine xmlns="" xmlns:a14="http://schemas.microsoft.com/office/drawing/2010/main" w="9525">
+                  <a14:hiddenLine xmlns:a14="http://schemas.microsoft.com/office/drawing/2010/main" xmlns="" w="9525">
                     <a:solidFill>
                       <a:srgbClr val="000000"/>
                     </a:solidFill>
@@ -11362,7 +12583,7 @@
               </a:ln>
               <a:extLst>
                 <a:ext uri="{91240B29-F687-4f45-9708-019B960494DF}">
-                  <a14:hiddenLine xmlns="" xmlns:a14="http://schemas.microsoft.com/office/drawing/2010/main" w="9525">
+                  <a14:hiddenLine xmlns:a14="http://schemas.microsoft.com/office/drawing/2010/main" xmlns="" w="9525">
                     <a:solidFill>
                       <a:srgbClr val="000000"/>
                     </a:solidFill>
@@ -11452,7 +12673,7 @@
               </a:ln>
               <a:extLst>
                 <a:ext uri="{91240B29-F687-4f45-9708-019B960494DF}">
-                  <a14:hiddenLine xmlns="" xmlns:a14="http://schemas.microsoft.com/office/drawing/2010/main" w="9525">
+                  <a14:hiddenLine xmlns:a14="http://schemas.microsoft.com/office/drawing/2010/main" xmlns="" w="9525">
                     <a:solidFill>
                       <a:srgbClr val="000000"/>
                     </a:solidFill>
@@ -11520,7 +12741,7 @@
               </a:ln>
               <a:extLst>
                 <a:ext uri="{91240B29-F687-4f45-9708-019B960494DF}">
-                  <a14:hiddenLine xmlns="" xmlns:a14="http://schemas.microsoft.com/office/drawing/2010/main" w="9525">
+                  <a14:hiddenLine xmlns:a14="http://schemas.microsoft.com/office/drawing/2010/main" xmlns="" w="9525">
                     <a:solidFill>
                       <a:srgbClr val="000000"/>
                     </a:solidFill>
@@ -11610,7 +12831,7 @@
               </a:ln>
               <a:extLst>
                 <a:ext uri="{91240B29-F687-4f45-9708-019B960494DF}">
-                  <a14:hiddenLine xmlns="" xmlns:a14="http://schemas.microsoft.com/office/drawing/2010/main" w="9525">
+                  <a14:hiddenLine xmlns:a14="http://schemas.microsoft.com/office/drawing/2010/main" xmlns="" w="9525">
                     <a:solidFill>
                       <a:srgbClr val="000000"/>
                     </a:solidFill>
@@ -11678,7 +12899,7 @@
               </a:ln>
               <a:extLst>
                 <a:ext uri="{91240B29-F687-4f45-9708-019B960494DF}">
-                  <a14:hiddenLine xmlns="" xmlns:a14="http://schemas.microsoft.com/office/drawing/2010/main" w="9525">
+                  <a14:hiddenLine xmlns:a14="http://schemas.microsoft.com/office/drawing/2010/main" xmlns="" w="9525">
                     <a:solidFill>
                       <a:srgbClr val="000000"/>
                     </a:solidFill>
@@ -11768,7 +12989,7 @@
               </a:ln>
               <a:extLst>
                 <a:ext uri="{91240B29-F687-4f45-9708-019B960494DF}">
-                  <a14:hiddenLine xmlns="" xmlns:a14="http://schemas.microsoft.com/office/drawing/2010/main" w="9525">
+                  <a14:hiddenLine xmlns:a14="http://schemas.microsoft.com/office/drawing/2010/main" xmlns="" w="9525">
                     <a:solidFill>
                       <a:srgbClr val="000000"/>
                     </a:solidFill>
@@ -11802,7 +13023,7 @@
               </a:ln>
               <a:extLst>
                 <a:ext uri="{91240B29-F687-4f45-9708-019B960494DF}">
-                  <a14:hiddenLine xmlns="" xmlns:a14="http://schemas.microsoft.com/office/drawing/2010/main" w="9525">
+                  <a14:hiddenLine xmlns:a14="http://schemas.microsoft.com/office/drawing/2010/main" xmlns="" w="9525">
                     <a:solidFill>
                       <a:srgbClr val="000000"/>
                     </a:solidFill>
@@ -11943,7 +13164,7 @@
             <a:fld id="{48A87A34-81AB-432B-8DAE-1953F412C126}" type="datetimeFigureOut">
               <a:rPr lang="en-US" dirty="0"/>
               <a:pPr/>
-              <a:t>3/26/2021</a:t>
+              <a:t>3/29/2021</a:t>
             </a:fld>
             <a:endParaRPr lang="en-US" dirty="0"/>
           </a:p>
@@ -12913,7 +14134,12 @@
             <p:ph type="title"/>
           </p:nvPr>
         </p:nvSpPr>
-        <p:spPr/>
+        <p:spPr>
+          <a:xfrm>
+            <a:off x="1141414" y="78381"/>
+            <a:ext cx="9905998" cy="1478570"/>
+          </a:xfrm>
+        </p:spPr>
         <p:txBody>
           <a:bodyPr/>
           <a:lstStyle/>
@@ -12941,15 +14167,23 @@
             <p:ph idx="1"/>
           </p:nvPr>
         </p:nvSpPr>
-        <p:spPr/>
+        <p:spPr>
+          <a:xfrm>
+            <a:off x="1141413" y="2249487"/>
+            <a:ext cx="9905999" cy="3541714"/>
+          </a:xfrm>
+        </p:spPr>
         <p:txBody>
           <a:bodyPr/>
           <a:lstStyle/>
           <a:p>
             <a:r>
               <a:rPr lang="pl-PL" dirty="0" err="1"/>
-              <a:t>while</a:t>
-            </a:r>
+              <a:t>While</a:t>
+            </a:r>
+            <a:endParaRPr lang="pl-PL" dirty="0"/>
+          </a:p>
+          <a:p>
             <a:endParaRPr lang="pl-PL" dirty="0"/>
           </a:p>
           <a:p>
@@ -12964,25 +14198,136 @@
             <a:endParaRPr lang="pl-PL" dirty="0"/>
           </a:p>
           <a:p>
+            <a:endParaRPr lang="pl-PL" dirty="0"/>
+          </a:p>
+          <a:p>
             <a:r>
               <a:rPr lang="pl-PL" dirty="0"/>
               <a:t>for</a:t>
             </a:r>
           </a:p>
-          <a:p>
-            <a:r>
-              <a:rPr lang="pl-PL" dirty="0">
-                <a:hlinkClick r:id="rId2"/>
-              </a:rPr>
-              <a:t>https://www.tutorialspoint.com/scala/scala_loop_types.htm</a:t>
-            </a:r>
-            <a:endParaRPr lang="pl-PL" dirty="0"/>
-          </a:p>
-          <a:p>
-            <a:endParaRPr lang="pl-PL" dirty="0"/>
-          </a:p>
         </p:txBody>
       </p:sp>
+      <p:pic>
+        <p:nvPicPr>
+          <p:cNvPr id="4" name="Picture 3">
+            <a:extLst>
+              <a:ext uri="{FF2B5EF4-FFF2-40B4-BE49-F238E27FC236}">
+                <a16:creationId xmlns:a16="http://schemas.microsoft.com/office/drawing/2014/main" id="{D3C9758A-70E6-401E-A113-1040160E88EA}"/>
+              </a:ext>
+            </a:extLst>
+          </p:cNvPr>
+          <p:cNvPicPr>
+            <a:picLocks noChangeAspect="1"/>
+          </p:cNvPicPr>
+          <p:nvPr/>
+        </p:nvPicPr>
+        <p:blipFill>
+          <a:blip r:embed="rId3"/>
+          <a:stretch>
+            <a:fillRect/>
+          </a:stretch>
+        </p:blipFill>
+        <p:spPr>
+          <a:xfrm>
+            <a:off x="6919491" y="2166463"/>
+            <a:ext cx="4280120" cy="3175163"/>
+          </a:xfrm>
+          <a:prstGeom prst="rect">
+            <a:avLst/>
+          </a:prstGeom>
+        </p:spPr>
+      </p:pic>
+      <p:pic>
+        <p:nvPicPr>
+          <p:cNvPr id="6" name="Picture 5">
+            <a:extLst>
+              <a:ext uri="{FF2B5EF4-FFF2-40B4-BE49-F238E27FC236}">
+                <a16:creationId xmlns:a16="http://schemas.microsoft.com/office/drawing/2014/main" id="{B66D6AEB-F05D-42BA-8DED-28D4C80F339E}"/>
+              </a:ext>
+            </a:extLst>
+          </p:cNvPr>
+          <p:cNvPicPr>
+            <a:picLocks noChangeAspect="1"/>
+          </p:cNvPicPr>
+          <p:nvPr/>
+        </p:nvPicPr>
+        <p:blipFill>
+          <a:blip r:embed="rId4"/>
+          <a:stretch>
+            <a:fillRect/>
+          </a:stretch>
+        </p:blipFill>
+        <p:spPr>
+          <a:xfrm>
+            <a:off x="3623022" y="3122656"/>
+            <a:ext cx="2438525" cy="1790792"/>
+          </a:xfrm>
+          <a:prstGeom prst="rect">
+            <a:avLst/>
+          </a:prstGeom>
+        </p:spPr>
+      </p:pic>
+      <p:pic>
+        <p:nvPicPr>
+          <p:cNvPr id="7" name="Picture 6">
+            <a:extLst>
+              <a:ext uri="{FF2B5EF4-FFF2-40B4-BE49-F238E27FC236}">
+                <a16:creationId xmlns:a16="http://schemas.microsoft.com/office/drawing/2014/main" id="{B0C81442-328B-4DD4-97B2-31DC0132D5B5}"/>
+              </a:ext>
+            </a:extLst>
+          </p:cNvPr>
+          <p:cNvPicPr>
+            <a:picLocks noChangeAspect="1"/>
+          </p:cNvPicPr>
+          <p:nvPr/>
+        </p:nvPicPr>
+        <p:blipFill>
+          <a:blip r:embed="rId5"/>
+          <a:stretch>
+            <a:fillRect/>
+          </a:stretch>
+        </p:blipFill>
+        <p:spPr>
+          <a:xfrm>
+            <a:off x="3623022" y="1350446"/>
+            <a:ext cx="2419474" cy="1632034"/>
+          </a:xfrm>
+          <a:prstGeom prst="rect">
+            <a:avLst/>
+          </a:prstGeom>
+        </p:spPr>
+      </p:pic>
+      <p:pic>
+        <p:nvPicPr>
+          <p:cNvPr id="8" name="Picture 7">
+            <a:extLst>
+              <a:ext uri="{FF2B5EF4-FFF2-40B4-BE49-F238E27FC236}">
+                <a16:creationId xmlns:a16="http://schemas.microsoft.com/office/drawing/2014/main" id="{6BBE575A-1392-4D53-9A47-A0C5755C6F40}"/>
+              </a:ext>
+            </a:extLst>
+          </p:cNvPr>
+          <p:cNvPicPr>
+            <a:picLocks noChangeAspect="1"/>
+          </p:cNvPicPr>
+          <p:nvPr/>
+        </p:nvPicPr>
+        <p:blipFill>
+          <a:blip r:embed="rId6"/>
+          <a:stretch>
+            <a:fillRect/>
+          </a:stretch>
+        </p:blipFill>
+        <p:spPr>
+          <a:xfrm>
+            <a:off x="3642073" y="5053624"/>
+            <a:ext cx="2419474" cy="1392642"/>
+          </a:xfrm>
+          <a:prstGeom prst="rect">
+            <a:avLst/>
+          </a:prstGeom>
+        </p:spPr>
+      </p:pic>
     </p:spTree>
     <p:extLst>
       <p:ext uri="{BB962C8B-B14F-4D97-AF65-F5344CB8AC3E}">
@@ -12997,6 +14342,533 @@
 </file>
 
 <file path=ppt/slides/slide4.xml><?xml version="1.0" encoding="utf-8"?>
+<p:sld xmlns:a="http://schemas.openxmlformats.org/drawingml/2006/main" xmlns:r="http://schemas.openxmlformats.org/officeDocument/2006/relationships" xmlns:p="http://schemas.openxmlformats.org/presentationml/2006/main">
+  <p:cSld>
+    <p:spTree>
+      <p:nvGrpSpPr>
+        <p:cNvPr id="1" name=""/>
+        <p:cNvGrpSpPr/>
+        <p:nvPr/>
+      </p:nvGrpSpPr>
+      <p:grpSpPr>
+        <a:xfrm>
+          <a:off x="0" y="0"/>
+          <a:ext cx="0" cy="0"/>
+          <a:chOff x="0" y="0"/>
+          <a:chExt cx="0" cy="0"/>
+        </a:xfrm>
+      </p:grpSpPr>
+      <p:sp>
+        <p:nvSpPr>
+          <p:cNvPr id="2" name="Tytuł 1">
+            <a:extLst>
+              <a:ext uri="{FF2B5EF4-FFF2-40B4-BE49-F238E27FC236}">
+                <a16:creationId xmlns:a16="http://schemas.microsoft.com/office/drawing/2014/main" id="{8CAEC374-7521-4C91-9ACD-5E1A45A244F7}"/>
+              </a:ext>
+            </a:extLst>
+          </p:cNvPr>
+          <p:cNvSpPr>
+            <a:spLocks noGrp="1"/>
+          </p:cNvSpPr>
+          <p:nvPr>
+            <p:ph type="title"/>
+          </p:nvPr>
+        </p:nvSpPr>
+        <p:spPr/>
+        <p:txBody>
+          <a:bodyPr/>
+          <a:lstStyle/>
+          <a:p>
+            <a:r>
+              <a:rPr lang="pl-PL" dirty="0" err="1"/>
+              <a:t>Ranges</a:t>
+            </a:r>
+            <a:endParaRPr lang="pl-PL" dirty="0"/>
+          </a:p>
+        </p:txBody>
+      </p:sp>
+      <p:sp>
+        <p:nvSpPr>
+          <p:cNvPr id="3" name="Symbol zastępczy zawartości 2">
+            <a:extLst>
+              <a:ext uri="{FF2B5EF4-FFF2-40B4-BE49-F238E27FC236}">
+                <a16:creationId xmlns:a16="http://schemas.microsoft.com/office/drawing/2014/main" id="{1778F441-815E-4984-AE65-4327714E8C75}"/>
+              </a:ext>
+            </a:extLst>
+          </p:cNvPr>
+          <p:cNvSpPr>
+            <a:spLocks noGrp="1"/>
+          </p:cNvSpPr>
+          <p:nvPr>
+            <p:ph idx="1"/>
+          </p:nvPr>
+        </p:nvSpPr>
+        <p:spPr>
+          <a:xfrm>
+            <a:off x="1141412" y="2249487"/>
+            <a:ext cx="4235987" cy="3541714"/>
+          </a:xfrm>
+        </p:spPr>
+        <p:txBody>
+          <a:bodyPr>
+            <a:normAutofit fontScale="85000" lnSpcReduction="20000"/>
+          </a:bodyPr>
+          <a:lstStyle/>
+          <a:p>
+            <a:r>
+              <a:rPr lang="pl-PL" dirty="0"/>
+              <a:t>1 to 10</a:t>
+            </a:r>
+          </a:p>
+          <a:p>
+            <a:r>
+              <a:rPr lang="pl-PL" dirty="0"/>
+              <a:t>1 </a:t>
+            </a:r>
+            <a:r>
+              <a:rPr lang="pl-PL" dirty="0" err="1"/>
+              <a:t>until</a:t>
+            </a:r>
+            <a:r>
+              <a:rPr lang="pl-PL" dirty="0"/>
+              <a:t> 10</a:t>
+            </a:r>
+          </a:p>
+          <a:p>
+            <a:r>
+              <a:rPr lang="pl-PL" dirty="0"/>
+              <a:t>1 to 10 by 2</a:t>
+            </a:r>
+          </a:p>
+          <a:p>
+            <a:r>
+              <a:rPr lang="pl-PL" dirty="0"/>
+              <a:t>'a' to ‚c’</a:t>
+            </a:r>
+          </a:p>
+          <a:p>
+            <a:endParaRPr lang="pl-PL" dirty="0"/>
+          </a:p>
+          <a:p>
+            <a:r>
+              <a:rPr lang="pl-PL" dirty="0"/>
+              <a:t>(1 to 10).</a:t>
+            </a:r>
+            <a:r>
+              <a:rPr lang="pl-PL" dirty="0" err="1"/>
+              <a:t>toList</a:t>
+            </a:r>
+            <a:endParaRPr lang="pl-PL" dirty="0"/>
+          </a:p>
+          <a:p>
+            <a:r>
+              <a:rPr lang="pl-PL" dirty="0"/>
+              <a:t>(1 to 10).</a:t>
+            </a:r>
+            <a:r>
+              <a:rPr lang="pl-PL" dirty="0" err="1"/>
+              <a:t>toArray</a:t>
+            </a:r>
+            <a:endParaRPr lang="pl-PL" dirty="0"/>
+          </a:p>
+          <a:p>
+            <a:r>
+              <a:rPr lang="pl-PL" dirty="0"/>
+              <a:t>(1 to 10).</a:t>
+            </a:r>
+            <a:r>
+              <a:rPr lang="pl-PL" dirty="0" err="1"/>
+              <a:t>toSet</a:t>
+            </a:r>
+            <a:endParaRPr lang="pl-PL" dirty="0"/>
+          </a:p>
+          <a:p>
+            <a:endParaRPr lang="pl-PL" dirty="0"/>
+          </a:p>
+        </p:txBody>
+      </p:sp>
+      <p:sp>
+        <p:nvSpPr>
+          <p:cNvPr id="5" name="Symbol zastępczy zawartości 2">
+            <a:extLst>
+              <a:ext uri="{FF2B5EF4-FFF2-40B4-BE49-F238E27FC236}">
+                <a16:creationId xmlns:a16="http://schemas.microsoft.com/office/drawing/2014/main" id="{8B8BED76-A509-461A-B43F-8292764F9049}"/>
+              </a:ext>
+            </a:extLst>
+          </p:cNvPr>
+          <p:cNvSpPr txBox="1">
+            <a:spLocks/>
+          </p:cNvSpPr>
+          <p:nvPr/>
+        </p:nvSpPr>
+        <p:spPr>
+          <a:xfrm>
+            <a:off x="5008939" y="911192"/>
+            <a:ext cx="4235987" cy="5059658"/>
+          </a:xfrm>
+          <a:prstGeom prst="rect">
+            <a:avLst/>
+          </a:prstGeom>
+        </p:spPr>
+        <p:txBody>
+          <a:bodyPr vert="horz" lIns="91440" tIns="45720" rIns="91440" bIns="45720" rtlCol="0">
+            <a:normAutofit/>
+          </a:bodyPr>
+          <a:lstStyle>
+            <a:lvl1pPr marL="228600" indent="-228600" algn="l" defTabSz="914400" rtl="0" eaLnBrk="1" latinLnBrk="0" hangingPunct="1">
+              <a:lnSpc>
+                <a:spcPct val="120000"/>
+              </a:lnSpc>
+              <a:spcBef>
+                <a:spcPts val="1000"/>
+              </a:spcBef>
+              <a:buSzPct val="125000"/>
+              <a:buFont typeface="Arial" panose="020B0604020202020204" pitchFamily="34" charset="0"/>
+              <a:buChar char="•"/>
+              <a:defRPr sz="2400" kern="1200">
+                <a:solidFill>
+                  <a:schemeClr val="tx1"/>
+                </a:solidFill>
+                <a:latin typeface="+mn-lt"/>
+                <a:ea typeface="+mn-ea"/>
+                <a:cs typeface="+mn-cs"/>
+              </a:defRPr>
+            </a:lvl1pPr>
+            <a:lvl2pPr marL="685800" indent="-228600" algn="l" defTabSz="914400" rtl="0" eaLnBrk="1" latinLnBrk="0" hangingPunct="1">
+              <a:lnSpc>
+                <a:spcPct val="120000"/>
+              </a:lnSpc>
+              <a:spcBef>
+                <a:spcPts val="500"/>
+              </a:spcBef>
+              <a:buSzPct val="125000"/>
+              <a:buFont typeface="Arial" panose="020B0604020202020204" pitchFamily="34" charset="0"/>
+              <a:buChar char="•"/>
+              <a:defRPr sz="2000" kern="1200">
+                <a:solidFill>
+                  <a:schemeClr val="tx1"/>
+                </a:solidFill>
+                <a:latin typeface="+mn-lt"/>
+                <a:ea typeface="+mn-ea"/>
+                <a:cs typeface="+mn-cs"/>
+              </a:defRPr>
+            </a:lvl2pPr>
+            <a:lvl3pPr marL="1143000" indent="-228600" algn="l" defTabSz="914400" rtl="0" eaLnBrk="1" latinLnBrk="0" hangingPunct="1">
+              <a:lnSpc>
+                <a:spcPct val="120000"/>
+              </a:lnSpc>
+              <a:spcBef>
+                <a:spcPts val="500"/>
+              </a:spcBef>
+              <a:buSzPct val="125000"/>
+              <a:buFont typeface="Arial" panose="020B0604020202020204" pitchFamily="34" charset="0"/>
+              <a:buChar char="•"/>
+              <a:defRPr sz="1800" kern="1200">
+                <a:solidFill>
+                  <a:schemeClr val="tx1"/>
+                </a:solidFill>
+                <a:latin typeface="+mn-lt"/>
+                <a:ea typeface="+mn-ea"/>
+                <a:cs typeface="+mn-cs"/>
+              </a:defRPr>
+            </a:lvl3pPr>
+            <a:lvl4pPr marL="1600200" indent="-228600" algn="l" defTabSz="914400" rtl="0" eaLnBrk="1" latinLnBrk="0" hangingPunct="1">
+              <a:lnSpc>
+                <a:spcPct val="120000"/>
+              </a:lnSpc>
+              <a:spcBef>
+                <a:spcPts val="500"/>
+              </a:spcBef>
+              <a:buSzPct val="125000"/>
+              <a:buFont typeface="Arial" panose="020B0604020202020204" pitchFamily="34" charset="0"/>
+              <a:buChar char="•"/>
+              <a:defRPr sz="1600" kern="1200">
+                <a:solidFill>
+                  <a:schemeClr val="tx1"/>
+                </a:solidFill>
+                <a:latin typeface="+mn-lt"/>
+                <a:ea typeface="+mn-ea"/>
+                <a:cs typeface="+mn-cs"/>
+              </a:defRPr>
+            </a:lvl4pPr>
+            <a:lvl5pPr marL="2057400" indent="-228600" algn="l" defTabSz="914400" rtl="0" eaLnBrk="1" latinLnBrk="0" hangingPunct="1">
+              <a:lnSpc>
+                <a:spcPct val="120000"/>
+              </a:lnSpc>
+              <a:spcBef>
+                <a:spcPts val="500"/>
+              </a:spcBef>
+              <a:buSzPct val="125000"/>
+              <a:buFont typeface="Arial" panose="020B0604020202020204" pitchFamily="34" charset="0"/>
+              <a:buChar char="•"/>
+              <a:defRPr sz="1600" kern="1200">
+                <a:solidFill>
+                  <a:schemeClr val="tx1"/>
+                </a:solidFill>
+                <a:latin typeface="+mn-lt"/>
+                <a:ea typeface="+mn-ea"/>
+                <a:cs typeface="+mn-cs"/>
+              </a:defRPr>
+            </a:lvl5pPr>
+            <a:lvl6pPr marL="2514600" indent="-228600" algn="l" defTabSz="914400" rtl="0" eaLnBrk="1" latinLnBrk="0" hangingPunct="1">
+              <a:lnSpc>
+                <a:spcPct val="120000"/>
+              </a:lnSpc>
+              <a:spcBef>
+                <a:spcPts val="500"/>
+              </a:spcBef>
+              <a:buSzPct val="125000"/>
+              <a:buFont typeface="Arial" panose="020B0604020202020204" pitchFamily="34" charset="0"/>
+              <a:buChar char="•"/>
+              <a:defRPr sz="1400" kern="1200">
+                <a:solidFill>
+                  <a:schemeClr val="tx1"/>
+                </a:solidFill>
+                <a:latin typeface="+mn-lt"/>
+                <a:ea typeface="+mn-ea"/>
+                <a:cs typeface="+mn-cs"/>
+              </a:defRPr>
+            </a:lvl6pPr>
+            <a:lvl7pPr marL="2971800" indent="-228600" algn="l" defTabSz="914400" rtl="0" eaLnBrk="1" latinLnBrk="0" hangingPunct="1">
+              <a:lnSpc>
+                <a:spcPct val="120000"/>
+              </a:lnSpc>
+              <a:spcBef>
+                <a:spcPts val="500"/>
+              </a:spcBef>
+              <a:buSzPct val="125000"/>
+              <a:buFont typeface="Arial" panose="020B0604020202020204" pitchFamily="34" charset="0"/>
+              <a:buChar char="•"/>
+              <a:defRPr sz="1400" kern="1200">
+                <a:solidFill>
+                  <a:schemeClr val="tx1"/>
+                </a:solidFill>
+                <a:latin typeface="+mn-lt"/>
+                <a:ea typeface="+mn-ea"/>
+                <a:cs typeface="+mn-cs"/>
+              </a:defRPr>
+            </a:lvl7pPr>
+            <a:lvl8pPr marL="3429000" indent="-228600" algn="l" defTabSz="914400" rtl="0" eaLnBrk="1" latinLnBrk="0" hangingPunct="1">
+              <a:lnSpc>
+                <a:spcPct val="120000"/>
+              </a:lnSpc>
+              <a:spcBef>
+                <a:spcPts val="500"/>
+              </a:spcBef>
+              <a:buSzPct val="125000"/>
+              <a:buFont typeface="Arial" panose="020B0604020202020204" pitchFamily="34" charset="0"/>
+              <a:buChar char="•"/>
+              <a:defRPr sz="1400" kern="1200">
+                <a:solidFill>
+                  <a:schemeClr val="tx1"/>
+                </a:solidFill>
+                <a:latin typeface="+mn-lt"/>
+                <a:ea typeface="+mn-ea"/>
+                <a:cs typeface="+mn-cs"/>
+              </a:defRPr>
+            </a:lvl8pPr>
+            <a:lvl9pPr marL="3886200" indent="-228600" algn="l" defTabSz="914400" rtl="0" eaLnBrk="1" latinLnBrk="0" hangingPunct="1">
+              <a:lnSpc>
+                <a:spcPct val="120000"/>
+              </a:lnSpc>
+              <a:spcBef>
+                <a:spcPts val="500"/>
+              </a:spcBef>
+              <a:buSzPct val="125000"/>
+              <a:buFont typeface="Arial" panose="020B0604020202020204" pitchFamily="34" charset="0"/>
+              <a:buChar char="•"/>
+              <a:defRPr sz="1400" kern="1200">
+                <a:solidFill>
+                  <a:schemeClr val="tx1"/>
+                </a:solidFill>
+                <a:latin typeface="+mn-lt"/>
+                <a:ea typeface="+mn-ea"/>
+                <a:cs typeface="+mn-cs"/>
+              </a:defRPr>
+            </a:lvl9pPr>
+          </a:lstStyle>
+          <a:p>
+            <a:pPr marL="0" indent="0">
+              <a:buNone/>
+            </a:pPr>
+            <a:r>
+              <a:rPr lang="pl-PL" dirty="0"/>
+              <a:t>Związane z pętlą for:</a:t>
+            </a:r>
+          </a:p>
+          <a:p>
+            <a:r>
+              <a:rPr lang="pl-PL" dirty="0"/>
+              <a:t>For z filtrami: </a:t>
+            </a:r>
+          </a:p>
+          <a:p>
+            <a:endParaRPr lang="pl-PL" dirty="0"/>
+          </a:p>
+          <a:p>
+            <a:r>
+              <a:rPr lang="pl-PL" dirty="0" err="1"/>
+              <a:t>Multiple</a:t>
+            </a:r>
+            <a:r>
+              <a:rPr lang="pl-PL" dirty="0"/>
+              <a:t> </a:t>
+            </a:r>
+            <a:r>
+              <a:rPr lang="pl-PL" dirty="0" err="1"/>
+              <a:t>ranges</a:t>
+            </a:r>
+            <a:r>
+              <a:rPr lang="pl-PL" dirty="0"/>
+              <a:t>: </a:t>
+            </a:r>
+          </a:p>
+          <a:p>
+            <a:endParaRPr lang="pl-PL" dirty="0"/>
+          </a:p>
+          <a:p>
+            <a:endParaRPr lang="pl-PL" dirty="0"/>
+          </a:p>
+          <a:p>
+            <a:endParaRPr lang="pl-PL" dirty="0"/>
+          </a:p>
+          <a:p>
+            <a:endParaRPr lang="pl-PL" dirty="0"/>
+          </a:p>
+          <a:p>
+            <a:r>
+              <a:rPr lang="pl-PL" dirty="0" err="1"/>
+              <a:t>Yield</a:t>
+            </a:r>
+            <a:r>
+              <a:rPr lang="pl-PL" dirty="0"/>
+              <a:t>:</a:t>
+            </a:r>
+          </a:p>
+          <a:p>
+            <a:endParaRPr lang="pl-PL" dirty="0"/>
+          </a:p>
+          <a:p>
+            <a:pPr marL="0" indent="0">
+              <a:buNone/>
+            </a:pPr>
+            <a:endParaRPr lang="pl-PL" dirty="0"/>
+          </a:p>
+          <a:p>
+            <a:endParaRPr lang="pl-PL" dirty="0"/>
+          </a:p>
+          <a:p>
+            <a:endParaRPr lang="pl-PL" dirty="0"/>
+          </a:p>
+          <a:p>
+            <a:endParaRPr lang="pl-PL" dirty="0"/>
+          </a:p>
+        </p:txBody>
+      </p:sp>
+      <p:pic>
+        <p:nvPicPr>
+          <p:cNvPr id="6" name="Picture 5">
+            <a:extLst>
+              <a:ext uri="{FF2B5EF4-FFF2-40B4-BE49-F238E27FC236}">
+                <a16:creationId xmlns:a16="http://schemas.microsoft.com/office/drawing/2014/main" id="{5D75680A-205F-4B9A-A89E-C4326EA8FA08}"/>
+              </a:ext>
+            </a:extLst>
+          </p:cNvPr>
+          <p:cNvPicPr>
+            <a:picLocks noChangeAspect="1"/>
+          </p:cNvPicPr>
+          <p:nvPr/>
+        </p:nvPicPr>
+        <p:blipFill>
+          <a:blip r:embed="rId3"/>
+          <a:stretch>
+            <a:fillRect/>
+          </a:stretch>
+        </p:blipFill>
+        <p:spPr>
+          <a:xfrm>
+            <a:off x="7456587" y="1524385"/>
+            <a:ext cx="3670489" cy="1104957"/>
+          </a:xfrm>
+          <a:prstGeom prst="rect">
+            <a:avLst/>
+          </a:prstGeom>
+        </p:spPr>
+      </p:pic>
+      <p:pic>
+        <p:nvPicPr>
+          <p:cNvPr id="7" name="Picture 6">
+            <a:extLst>
+              <a:ext uri="{FF2B5EF4-FFF2-40B4-BE49-F238E27FC236}">
+                <a16:creationId xmlns:a16="http://schemas.microsoft.com/office/drawing/2014/main" id="{90F0A87F-716E-4B60-A7AB-D7274F6DF0BD}"/>
+              </a:ext>
+            </a:extLst>
+          </p:cNvPr>
+          <p:cNvPicPr>
+            <a:picLocks noChangeAspect="1"/>
+          </p:cNvPicPr>
+          <p:nvPr/>
+        </p:nvPicPr>
+        <p:blipFill>
+          <a:blip r:embed="rId4"/>
+          <a:stretch>
+            <a:fillRect/>
+          </a:stretch>
+        </p:blipFill>
+        <p:spPr>
+          <a:xfrm>
+            <a:off x="7456587" y="2775680"/>
+            <a:ext cx="3867349" cy="2489328"/>
+          </a:xfrm>
+          <a:prstGeom prst="rect">
+            <a:avLst/>
+          </a:prstGeom>
+        </p:spPr>
+      </p:pic>
+      <p:pic>
+        <p:nvPicPr>
+          <p:cNvPr id="8" name="Picture 7">
+            <a:extLst>
+              <a:ext uri="{FF2B5EF4-FFF2-40B4-BE49-F238E27FC236}">
+                <a16:creationId xmlns:a16="http://schemas.microsoft.com/office/drawing/2014/main" id="{D2C29452-1347-42C6-BF88-87C3D7F9A405}"/>
+              </a:ext>
+            </a:extLst>
+          </p:cNvPr>
+          <p:cNvPicPr>
+            <a:picLocks noChangeAspect="1"/>
+          </p:cNvPicPr>
+          <p:nvPr/>
+        </p:nvPicPr>
+        <p:blipFill>
+          <a:blip r:embed="rId5"/>
+          <a:stretch>
+            <a:fillRect/>
+          </a:stretch>
+        </p:blipFill>
+        <p:spPr>
+          <a:xfrm>
+            <a:off x="7456587" y="5362702"/>
+            <a:ext cx="3194214" cy="914447"/>
+          </a:xfrm>
+          <a:prstGeom prst="rect">
+            <a:avLst/>
+          </a:prstGeom>
+        </p:spPr>
+      </p:pic>
+    </p:spTree>
+    <p:extLst>
+      <p:ext uri="{BB962C8B-B14F-4D97-AF65-F5344CB8AC3E}">
+        <p14:creationId xmlns:p14="http://schemas.microsoft.com/office/powerpoint/2010/main" val="2789720930"/>
+      </p:ext>
+    </p:extLst>
+  </p:cSld>
+  <p:clrMapOvr>
+    <a:masterClrMapping/>
+  </p:clrMapOvr>
+</p:sld>
+</file>
+
+<file path=ppt/slides/slide5.xml><?xml version="1.0" encoding="utf-8"?>
 <p:sld xmlns:a="http://schemas.openxmlformats.org/drawingml/2006/main" xmlns:r="http://schemas.openxmlformats.org/officeDocument/2006/relationships" xmlns:p="http://schemas.openxmlformats.org/presentationml/2006/main">
   <p:cSld>
     <p:spTree>
@@ -13071,22 +14943,22 @@
           <a:lstStyle/>
           <a:p>
             <a:r>
-              <a:rPr lang="pl-PL" dirty="0">
-                <a:hlinkClick r:id="rId2"/>
-              </a:rPr>
-              <a:t>https://docs.scala-lang.org/overviews/scala-book/for-loops.htmlforeach</a:t>
-            </a:r>
-            <a:r>
-              <a:rPr lang="pl-PL" dirty="0"/>
-              <a:t> </a:t>
-            </a:r>
-          </a:p>
-          <a:p>
+              <a:rPr lang="pl-PL" i="1" dirty="0"/>
+              <a:t>„</a:t>
+            </a:r>
+            <a:r>
+              <a:rPr lang="en-US" i="1" dirty="0"/>
+              <a:t>foreach takes a procedure — a function with a result type Unit — as the right operand. It simply applies the procedure to each List element. The result of the operation is again Unit; no list of results is assembled.</a:t>
+            </a:r>
+            <a:r>
+              <a:rPr lang="pl-PL" i="1" dirty="0"/>
+              <a:t>” – </a:t>
+            </a:r>
             <a:r>
               <a:rPr lang="pl-PL" dirty="0">
                 <a:hlinkClick r:id="rId3"/>
               </a:rPr>
-              <a:t>https://alvinalexander.com/scala/iterating-scala-lists-foreach-for-comprehension/</a:t>
+              <a:t>Programming in Scala</a:t>
             </a:r>
             <a:endParaRPr lang="pl-PL" dirty="0"/>
           </a:p>
@@ -13095,103 +14967,70 @@
           </a:p>
         </p:txBody>
       </p:sp>
+      <p:pic>
+        <p:nvPicPr>
+          <p:cNvPr id="4" name="Picture 3">
+            <a:extLst>
+              <a:ext uri="{FF2B5EF4-FFF2-40B4-BE49-F238E27FC236}">
+                <a16:creationId xmlns:a16="http://schemas.microsoft.com/office/drawing/2014/main" id="{8C77DCA6-2F9D-4B75-B7E8-CFE9D4CAE7F8}"/>
+              </a:ext>
+            </a:extLst>
+          </p:cNvPr>
+          <p:cNvPicPr>
+            <a:picLocks noChangeAspect="1"/>
+          </p:cNvPicPr>
+          <p:nvPr/>
+        </p:nvPicPr>
+        <p:blipFill>
+          <a:blip r:embed="rId4"/>
+          <a:stretch>
+            <a:fillRect/>
+          </a:stretch>
+        </p:blipFill>
+        <p:spPr>
+          <a:xfrm>
+            <a:off x="1597142" y="4014095"/>
+            <a:ext cx="4100255" cy="2225387"/>
+          </a:xfrm>
+          <a:prstGeom prst="rect">
+            <a:avLst/>
+          </a:prstGeom>
+        </p:spPr>
+      </p:pic>
+      <p:pic>
+        <p:nvPicPr>
+          <p:cNvPr id="5" name="Picture 4">
+            <a:extLst>
+              <a:ext uri="{FF2B5EF4-FFF2-40B4-BE49-F238E27FC236}">
+                <a16:creationId xmlns:a16="http://schemas.microsoft.com/office/drawing/2014/main" id="{001C9F05-7A68-4DB2-B961-67E3451235E1}"/>
+              </a:ext>
+            </a:extLst>
+          </p:cNvPr>
+          <p:cNvPicPr>
+            <a:picLocks noChangeAspect="1"/>
+          </p:cNvPicPr>
+          <p:nvPr/>
+        </p:nvPicPr>
+        <p:blipFill>
+          <a:blip r:embed="rId5"/>
+          <a:stretch>
+            <a:fillRect/>
+          </a:stretch>
+        </p:blipFill>
+        <p:spPr>
+          <a:xfrm>
+            <a:off x="6153126" y="3758049"/>
+            <a:ext cx="4282629" cy="2749975"/>
+          </a:xfrm>
+          <a:prstGeom prst="rect">
+            <a:avLst/>
+          </a:prstGeom>
+        </p:spPr>
+      </p:pic>
     </p:spTree>
     <p:extLst>
       <p:ext uri="{BB962C8B-B14F-4D97-AF65-F5344CB8AC3E}">
         <p14:creationId xmlns:p14="http://schemas.microsoft.com/office/powerpoint/2010/main" val="3101150038"/>
-      </p:ext>
-    </p:extLst>
-  </p:cSld>
-  <p:clrMapOvr>
-    <a:masterClrMapping/>
-  </p:clrMapOvr>
-</p:sld>
-</file>
-
-<file path=ppt/slides/slide5.xml><?xml version="1.0" encoding="utf-8"?>
-<p:sld xmlns:a="http://schemas.openxmlformats.org/drawingml/2006/main" xmlns:r="http://schemas.openxmlformats.org/officeDocument/2006/relationships" xmlns:p="http://schemas.openxmlformats.org/presentationml/2006/main">
-  <p:cSld>
-    <p:spTree>
-      <p:nvGrpSpPr>
-        <p:cNvPr id="1" name=""/>
-        <p:cNvGrpSpPr/>
-        <p:nvPr/>
-      </p:nvGrpSpPr>
-      <p:grpSpPr>
-        <a:xfrm>
-          <a:off x="0" y="0"/>
-          <a:ext cx="0" cy="0"/>
-          <a:chOff x="0" y="0"/>
-          <a:chExt cx="0" cy="0"/>
-        </a:xfrm>
-      </p:grpSpPr>
-      <p:sp>
-        <p:nvSpPr>
-          <p:cNvPr id="2" name="Tytuł 1">
-            <a:extLst>
-              <a:ext uri="{FF2B5EF4-FFF2-40B4-BE49-F238E27FC236}">
-                <a16:creationId xmlns:a16="http://schemas.microsoft.com/office/drawing/2014/main" id="{8CAEC374-7521-4C91-9ACD-5E1A45A244F7}"/>
-              </a:ext>
-            </a:extLst>
-          </p:cNvPr>
-          <p:cNvSpPr>
-            <a:spLocks noGrp="1"/>
-          </p:cNvSpPr>
-          <p:nvPr>
-            <p:ph type="title"/>
-          </p:nvPr>
-        </p:nvSpPr>
-        <p:spPr/>
-        <p:txBody>
-          <a:bodyPr/>
-          <a:lstStyle/>
-          <a:p>
-            <a:r>
-              <a:rPr lang="pl-PL" dirty="0" err="1"/>
-              <a:t>Ranges</a:t>
-            </a:r>
-            <a:endParaRPr lang="pl-PL" dirty="0"/>
-          </a:p>
-        </p:txBody>
-      </p:sp>
-      <p:sp>
-        <p:nvSpPr>
-          <p:cNvPr id="3" name="Symbol zastępczy zawartości 2">
-            <a:extLst>
-              <a:ext uri="{FF2B5EF4-FFF2-40B4-BE49-F238E27FC236}">
-                <a16:creationId xmlns:a16="http://schemas.microsoft.com/office/drawing/2014/main" id="{1778F441-815E-4984-AE65-4327714E8C75}"/>
-              </a:ext>
-            </a:extLst>
-          </p:cNvPr>
-          <p:cNvSpPr>
-            <a:spLocks noGrp="1"/>
-          </p:cNvSpPr>
-          <p:nvPr>
-            <p:ph idx="1"/>
-          </p:nvPr>
-        </p:nvSpPr>
-        <p:spPr/>
-        <p:txBody>
-          <a:bodyPr/>
-          <a:lstStyle/>
-          <a:p>
-            <a:r>
-              <a:rPr lang="pl-PL" dirty="0">
-                <a:hlinkClick r:id="rId2"/>
-              </a:rPr>
-              <a:t>https://alvinalexander.com/scala/how-to-use-range-class-in-scala-cookbook/</a:t>
-            </a:r>
-            <a:endParaRPr lang="pl-PL" dirty="0"/>
-          </a:p>
-          <a:p>
-            <a:endParaRPr lang="pl-PL" dirty="0"/>
-          </a:p>
-        </p:txBody>
-      </p:sp>
-    </p:spTree>
-    <p:extLst>
-      <p:ext uri="{BB962C8B-B14F-4D97-AF65-F5344CB8AC3E}">
-        <p14:creationId xmlns:p14="http://schemas.microsoft.com/office/powerpoint/2010/main" val="2789720930"/>
       </p:ext>
     </p:extLst>
   </p:cSld>
@@ -13262,24 +15101,117 @@
             <p:ph idx="1"/>
           </p:nvPr>
         </p:nvSpPr>
-        <p:spPr/>
+        <p:spPr>
+          <a:xfrm>
+            <a:off x="591285" y="1837548"/>
+            <a:ext cx="7312217" cy="3541714"/>
+          </a:xfrm>
+        </p:spPr>
         <p:txBody>
           <a:bodyPr/>
           <a:lstStyle/>
           <a:p>
             <a:r>
-              <a:rPr lang="pl-PL" dirty="0">
-                <a:hlinkClick r:id="rId2"/>
+              <a:rPr lang="pl-PL" dirty="0"/>
+              <a:t>Przechowywanie stałych elementów tego samego typu</a:t>
+            </a:r>
+          </a:p>
+          <a:p>
+            <a:r>
+              <a:rPr lang="pl-PL" i="1" dirty="0"/>
+              <a:t>„</a:t>
+            </a:r>
+            <a:r>
+              <a:rPr lang="en-US" i="1" dirty="0"/>
+              <a:t>Arrays are mutable, indexed collections of values. </a:t>
+            </a:r>
+            <a:br>
+              <a:rPr lang="pl-PL" i="1" dirty="0"/>
+            </a:br>
+            <a:r>
+              <a:rPr lang="en-US" i="1" dirty="0"/>
+              <a:t>Array[T] is Scala's representation for Java's T[].</a:t>
+            </a:r>
+            <a:r>
+              <a:rPr lang="pl-PL" i="1" dirty="0"/>
+              <a:t>” – </a:t>
+            </a:r>
+            <a:r>
+              <a:rPr lang="pl-PL" i="1" dirty="0">
+                <a:hlinkClick r:id="rId3"/>
               </a:rPr>
-              <a:t>https://www.tutorialspoint.com/scala/scala_arrays.htm</a:t>
-            </a:r>
-            <a:endParaRPr lang="pl-PL" dirty="0"/>
-          </a:p>
-          <a:p>
-            <a:endParaRPr lang="pl-PL" dirty="0"/>
+              <a:t>scala </a:t>
+            </a:r>
+            <a:r>
+              <a:rPr lang="pl-PL" i="1" dirty="0" err="1">
+                <a:hlinkClick r:id="rId3"/>
+              </a:rPr>
+              <a:t>documentation</a:t>
+            </a:r>
+            <a:endParaRPr lang="pl-PL" i="1" dirty="0"/>
           </a:p>
         </p:txBody>
       </p:sp>
+      <p:pic>
+        <p:nvPicPr>
+          <p:cNvPr id="5" name="Picture 4">
+            <a:extLst>
+              <a:ext uri="{FF2B5EF4-FFF2-40B4-BE49-F238E27FC236}">
+                <a16:creationId xmlns:a16="http://schemas.microsoft.com/office/drawing/2014/main" id="{F573656E-6745-48EE-A6BF-D01D7B578A87}"/>
+              </a:ext>
+            </a:extLst>
+          </p:cNvPr>
+          <p:cNvPicPr>
+            <a:picLocks noChangeAspect="1"/>
+          </p:cNvPicPr>
+          <p:nvPr/>
+        </p:nvPicPr>
+        <p:blipFill>
+          <a:blip r:embed="rId4"/>
+          <a:stretch>
+            <a:fillRect/>
+          </a:stretch>
+        </p:blipFill>
+        <p:spPr>
+          <a:xfrm>
+            <a:off x="1485748" y="3806348"/>
+            <a:ext cx="4900062" cy="2753932"/>
+          </a:xfrm>
+          <a:prstGeom prst="rect">
+            <a:avLst/>
+          </a:prstGeom>
+        </p:spPr>
+      </p:pic>
+      <p:pic>
+        <p:nvPicPr>
+          <p:cNvPr id="6" name="Picture 5">
+            <a:extLst>
+              <a:ext uri="{FF2B5EF4-FFF2-40B4-BE49-F238E27FC236}">
+                <a16:creationId xmlns:a16="http://schemas.microsoft.com/office/drawing/2014/main" id="{CE22DDED-89BF-435F-BB9E-C8CCE07E50FB}"/>
+              </a:ext>
+            </a:extLst>
+          </p:cNvPr>
+          <p:cNvPicPr>
+            <a:picLocks noChangeAspect="1"/>
+          </p:cNvPicPr>
+          <p:nvPr/>
+        </p:nvPicPr>
+        <p:blipFill>
+          <a:blip r:embed="rId5"/>
+          <a:stretch>
+            <a:fillRect/>
+          </a:stretch>
+        </p:blipFill>
+        <p:spPr>
+          <a:xfrm>
+            <a:off x="7903502" y="1478738"/>
+            <a:ext cx="3868648" cy="4655220"/>
+          </a:xfrm>
+          <a:prstGeom prst="rect">
+            <a:avLst/>
+          </a:prstGeom>
+        </p:spPr>
+      </p:pic>
     </p:spTree>
     <p:extLst>
       <p:ext uri="{BB962C8B-B14F-4D97-AF65-F5344CB8AC3E}">
@@ -13354,24 +15286,108 @@
             <p:ph idx="1"/>
           </p:nvPr>
         </p:nvSpPr>
-        <p:spPr/>
+        <p:spPr>
+          <a:xfrm>
+            <a:off x="1141412" y="2249487"/>
+            <a:ext cx="5836509" cy="3541714"/>
+          </a:xfrm>
+        </p:spPr>
         <p:txBody>
           <a:bodyPr/>
           <a:lstStyle/>
           <a:p>
             <a:r>
-              <a:rPr lang="pl-PL" dirty="0">
-                <a:hlinkClick r:id="rId2"/>
+              <a:rPr lang="pl-PL" i="1" dirty="0" err="1"/>
+              <a:t>Immutable</a:t>
+            </a:r>
+            <a:endParaRPr lang="pl-PL" i="1" dirty="0"/>
+          </a:p>
+          <a:p>
+            <a:r>
+              <a:rPr lang="pl-PL" i="1" dirty="0"/>
+              <a:t>„</a:t>
+            </a:r>
+            <a:r>
+              <a:rPr lang="en-US" i="1" dirty="0"/>
+              <a:t>Sequences are special cases of </a:t>
+            </a:r>
+            <a:r>
+              <a:rPr lang="en-US" i="1" dirty="0" err="1"/>
+              <a:t>iterable</a:t>
+            </a:r>
+            <a:r>
+              <a:rPr lang="en-US" i="1" dirty="0"/>
+              <a:t> collections of class </a:t>
+            </a:r>
+            <a:r>
+              <a:rPr lang="en-US" i="1" dirty="0" err="1"/>
+              <a:t>Iterable</a:t>
+            </a:r>
+            <a:r>
+              <a:rPr lang="en-US" i="1" dirty="0"/>
+              <a:t>. Unlike </a:t>
+            </a:r>
+            <a:r>
+              <a:rPr lang="en-US" i="1" dirty="0" err="1"/>
+              <a:t>iterables</a:t>
+            </a:r>
+            <a:r>
+              <a:rPr lang="en-US" i="1" dirty="0"/>
+              <a:t>, sequences always have a defined order of elements</a:t>
+            </a:r>
+            <a:r>
+              <a:rPr lang="pl-PL" i="1" dirty="0"/>
+              <a:t>” – </a:t>
+            </a:r>
+            <a:r>
+              <a:rPr lang="pl-PL" i="1" dirty="0">
+                <a:hlinkClick r:id="rId3"/>
               </a:rPr>
-              <a:t>https://stackoverflow.com/questions/10866639/difference-between-a-seq-and-a-list-in-scala</a:t>
-            </a:r>
-            <a:endParaRPr lang="pl-PL" dirty="0"/>
+              <a:t>scala </a:t>
+            </a:r>
+            <a:r>
+              <a:rPr lang="pl-PL" i="1" dirty="0" err="1">
+                <a:hlinkClick r:id="rId3"/>
+              </a:rPr>
+              <a:t>documentation</a:t>
+            </a:r>
+            <a:endParaRPr lang="pl-PL" i="1" dirty="0"/>
           </a:p>
           <a:p>
             <a:endParaRPr lang="pl-PL" dirty="0"/>
           </a:p>
         </p:txBody>
       </p:sp>
+      <p:pic>
+        <p:nvPicPr>
+          <p:cNvPr id="5" name="Picture 4">
+            <a:extLst>
+              <a:ext uri="{FF2B5EF4-FFF2-40B4-BE49-F238E27FC236}">
+                <a16:creationId xmlns:a16="http://schemas.microsoft.com/office/drawing/2014/main" id="{61BCA651-4B04-406D-A453-1650665EE6D2}"/>
+              </a:ext>
+            </a:extLst>
+          </p:cNvPr>
+          <p:cNvPicPr>
+            <a:picLocks noChangeAspect="1"/>
+          </p:cNvPicPr>
+          <p:nvPr/>
+        </p:nvPicPr>
+        <p:blipFill>
+          <a:blip r:embed="rId4"/>
+          <a:stretch>
+            <a:fillRect/>
+          </a:stretch>
+        </p:blipFill>
+        <p:spPr>
+          <a:xfrm>
+            <a:off x="7046023" y="1994654"/>
+            <a:ext cx="4131930" cy="3100829"/>
+          </a:xfrm>
+          <a:prstGeom prst="rect">
+            <a:avLst/>
+          </a:prstGeom>
+        </p:spPr>
+      </p:pic>
     </p:spTree>
     <p:extLst>
       <p:ext uri="{BB962C8B-B14F-4D97-AF65-F5344CB8AC3E}">
@@ -13801,4 +15817,299 @@
     </a:ext>
   </a:extLst>
 </a:theme>
+</file>
+
+<file path=ppt/theme/theme2.xml><?xml version="1.0" encoding="utf-8"?>
+<a:theme xmlns:a="http://schemas.openxmlformats.org/drawingml/2006/main" name="Office Theme">
+  <a:themeElements>
+    <a:clrScheme name="Office">
+      <a:dk1>
+        <a:sysClr val="windowText" lastClr="000000"/>
+      </a:dk1>
+      <a:lt1>
+        <a:sysClr val="window" lastClr="FFFFFF"/>
+      </a:lt1>
+      <a:dk2>
+        <a:srgbClr val="44546A"/>
+      </a:dk2>
+      <a:lt2>
+        <a:srgbClr val="E7E6E6"/>
+      </a:lt2>
+      <a:accent1>
+        <a:srgbClr val="4472C4"/>
+      </a:accent1>
+      <a:accent2>
+        <a:srgbClr val="ED7D31"/>
+      </a:accent2>
+      <a:accent3>
+        <a:srgbClr val="A5A5A5"/>
+      </a:accent3>
+      <a:accent4>
+        <a:srgbClr val="FFC000"/>
+      </a:accent4>
+      <a:accent5>
+        <a:srgbClr val="5B9BD5"/>
+      </a:accent5>
+      <a:accent6>
+        <a:srgbClr val="70AD47"/>
+      </a:accent6>
+      <a:hlink>
+        <a:srgbClr val="0563C1"/>
+      </a:hlink>
+      <a:folHlink>
+        <a:srgbClr val="954F72"/>
+      </a:folHlink>
+    </a:clrScheme>
+    <a:fontScheme name="Office">
+      <a:majorFont>
+        <a:latin typeface="Calibri Light" panose="020F0302020204030204"/>
+        <a:ea typeface=""/>
+        <a:cs typeface=""/>
+        <a:font script="Jpan" typeface="游ゴシック Light"/>
+        <a:font script="Hang" typeface="맑은 고딕"/>
+        <a:font script="Hans" typeface="等线 Light"/>
+        <a:font script="Hant" typeface="新細明體"/>
+        <a:font script="Arab" typeface="Times New Roman"/>
+        <a:font script="Hebr" typeface="Times New Roman"/>
+        <a:font script="Thai" typeface="Angsana New"/>
+        <a:font script="Ethi" typeface="Nyala"/>
+        <a:font script="Beng" typeface="Vrinda"/>
+        <a:font script="Gujr" typeface="Shruti"/>
+        <a:font script="Khmr" typeface="MoolBoran"/>
+        <a:font script="Knda" typeface="Tunga"/>
+        <a:font script="Guru" typeface="Raavi"/>
+        <a:font script="Cans" typeface="Euphemia"/>
+        <a:font script="Cher" typeface="Plantagenet Cherokee"/>
+        <a:font script="Yiii" typeface="Microsoft Yi Baiti"/>
+        <a:font script="Tibt" typeface="Microsoft Himalaya"/>
+        <a:font script="Thaa" typeface="MV Boli"/>
+        <a:font script="Deva" typeface="Mangal"/>
+        <a:font script="Telu" typeface="Gautami"/>
+        <a:font script="Taml" typeface="Latha"/>
+        <a:font script="Syrc" typeface="Estrangelo Edessa"/>
+        <a:font script="Orya" typeface="Kalinga"/>
+        <a:font script="Mlym" typeface="Kartika"/>
+        <a:font script="Laoo" typeface="DokChampa"/>
+        <a:font script="Sinh" typeface="Iskoola Pota"/>
+        <a:font script="Mong" typeface="Mongolian Baiti"/>
+        <a:font script="Viet" typeface="Times New Roman"/>
+        <a:font script="Uigh" typeface="Microsoft Uighur"/>
+        <a:font script="Geor" typeface="Sylfaen"/>
+        <a:font script="Armn" typeface="Arial"/>
+        <a:font script="Bugi" typeface="Leelawadee UI"/>
+        <a:font script="Bopo" typeface="Microsoft JhengHei"/>
+        <a:font script="Java" typeface="Javanese Text"/>
+        <a:font script="Lisu" typeface="Segoe UI"/>
+        <a:font script="Mymr" typeface="Myanmar Text"/>
+        <a:font script="Nkoo" typeface="Ebrima"/>
+        <a:font script="Olck" typeface="Nirmala UI"/>
+        <a:font script="Osma" typeface="Ebrima"/>
+        <a:font script="Phag" typeface="Phagspa"/>
+        <a:font script="Syrn" typeface="Estrangelo Edessa"/>
+        <a:font script="Syrj" typeface="Estrangelo Edessa"/>
+        <a:font script="Syre" typeface="Estrangelo Edessa"/>
+        <a:font script="Sora" typeface="Nirmala UI"/>
+        <a:font script="Tale" typeface="Microsoft Tai Le"/>
+        <a:font script="Talu" typeface="Microsoft New Tai Lue"/>
+        <a:font script="Tfng" typeface="Ebrima"/>
+      </a:majorFont>
+      <a:minorFont>
+        <a:latin typeface="Calibri" panose="020F0502020204030204"/>
+        <a:ea typeface=""/>
+        <a:cs typeface=""/>
+        <a:font script="Jpan" typeface="游ゴシック"/>
+        <a:font script="Hang" typeface="맑은 고딕"/>
+        <a:font script="Hans" typeface="等线"/>
+        <a:font script="Hant" typeface="新細明體"/>
+        <a:font script="Arab" typeface="Arial"/>
+        <a:font script="Hebr" typeface="Arial"/>
+        <a:font script="Thai" typeface="Cordia New"/>
+        <a:font script="Ethi" typeface="Nyala"/>
+        <a:font script="Beng" typeface="Vrinda"/>
+        <a:font script="Gujr" typeface="Shruti"/>
+        <a:font script="Khmr" typeface="DaunPenh"/>
+        <a:font script="Knda" typeface="Tunga"/>
+        <a:font script="Guru" typeface="Raavi"/>
+        <a:font script="Cans" typeface="Euphemia"/>
+        <a:font script="Cher" typeface="Plantagenet Cherokee"/>
+        <a:font script="Yiii" typeface="Microsoft Yi Baiti"/>
+        <a:font script="Tibt" typeface="Microsoft Himalaya"/>
+        <a:font script="Thaa" typeface="MV Boli"/>
+        <a:font script="Deva" typeface="Mangal"/>
+        <a:font script="Telu" typeface="Gautami"/>
+        <a:font script="Taml" typeface="Latha"/>
+        <a:font script="Syrc" typeface="Estrangelo Edessa"/>
+        <a:font script="Orya" typeface="Kalinga"/>
+        <a:font script="Mlym" typeface="Kartika"/>
+        <a:font script="Laoo" typeface="DokChampa"/>
+        <a:font script="Sinh" typeface="Iskoola Pota"/>
+        <a:font script="Mong" typeface="Mongolian Baiti"/>
+        <a:font script="Viet" typeface="Arial"/>
+        <a:font script="Uigh" typeface="Microsoft Uighur"/>
+        <a:font script="Geor" typeface="Sylfaen"/>
+        <a:font script="Armn" typeface="Arial"/>
+        <a:font script="Bugi" typeface="Leelawadee UI"/>
+        <a:font script="Bopo" typeface="Microsoft JhengHei"/>
+        <a:font script="Java" typeface="Javanese Text"/>
+        <a:font script="Lisu" typeface="Segoe UI"/>
+        <a:font script="Mymr" typeface="Myanmar Text"/>
+        <a:font script="Nkoo" typeface="Ebrima"/>
+        <a:font script="Olck" typeface="Nirmala UI"/>
+        <a:font script="Osma" typeface="Ebrima"/>
+        <a:font script="Phag" typeface="Phagspa"/>
+        <a:font script="Syrn" typeface="Estrangelo Edessa"/>
+        <a:font script="Syrj" typeface="Estrangelo Edessa"/>
+        <a:font script="Syre" typeface="Estrangelo Edessa"/>
+        <a:font script="Sora" typeface="Nirmala UI"/>
+        <a:font script="Tale" typeface="Microsoft Tai Le"/>
+        <a:font script="Talu" typeface="Microsoft New Tai Lue"/>
+        <a:font script="Tfng" typeface="Ebrima"/>
+      </a:minorFont>
+    </a:fontScheme>
+    <a:fmtScheme name="Office">
+      <a:fillStyleLst>
+        <a:solidFill>
+          <a:schemeClr val="phClr"/>
+        </a:solidFill>
+        <a:gradFill rotWithShape="1">
+          <a:gsLst>
+            <a:gs pos="0">
+              <a:schemeClr val="phClr">
+                <a:lumMod val="110000"/>
+                <a:satMod val="105000"/>
+                <a:tint val="67000"/>
+              </a:schemeClr>
+            </a:gs>
+            <a:gs pos="50000">
+              <a:schemeClr val="phClr">
+                <a:lumMod val="105000"/>
+                <a:satMod val="103000"/>
+                <a:tint val="73000"/>
+              </a:schemeClr>
+            </a:gs>
+            <a:gs pos="100000">
+              <a:schemeClr val="phClr">
+                <a:lumMod val="105000"/>
+                <a:satMod val="109000"/>
+                <a:tint val="81000"/>
+              </a:schemeClr>
+            </a:gs>
+          </a:gsLst>
+          <a:lin ang="5400000" scaled="0"/>
+        </a:gradFill>
+        <a:gradFill rotWithShape="1">
+          <a:gsLst>
+            <a:gs pos="0">
+              <a:schemeClr val="phClr">
+                <a:satMod val="103000"/>
+                <a:lumMod val="102000"/>
+                <a:tint val="94000"/>
+              </a:schemeClr>
+            </a:gs>
+            <a:gs pos="50000">
+              <a:schemeClr val="phClr">
+                <a:satMod val="110000"/>
+                <a:lumMod val="100000"/>
+                <a:shade val="100000"/>
+              </a:schemeClr>
+            </a:gs>
+            <a:gs pos="100000">
+              <a:schemeClr val="phClr">
+                <a:lumMod val="99000"/>
+                <a:satMod val="120000"/>
+                <a:shade val="78000"/>
+              </a:schemeClr>
+            </a:gs>
+          </a:gsLst>
+          <a:lin ang="5400000" scaled="0"/>
+        </a:gradFill>
+      </a:fillStyleLst>
+      <a:lnStyleLst>
+        <a:ln w="6350" cap="flat" cmpd="sng" algn="ctr">
+          <a:solidFill>
+            <a:schemeClr val="phClr"/>
+          </a:solidFill>
+          <a:prstDash val="solid"/>
+          <a:miter lim="800000"/>
+        </a:ln>
+        <a:ln w="12700" cap="flat" cmpd="sng" algn="ctr">
+          <a:solidFill>
+            <a:schemeClr val="phClr"/>
+          </a:solidFill>
+          <a:prstDash val="solid"/>
+          <a:miter lim="800000"/>
+        </a:ln>
+        <a:ln w="19050" cap="flat" cmpd="sng" algn="ctr">
+          <a:solidFill>
+            <a:schemeClr val="phClr"/>
+          </a:solidFill>
+          <a:prstDash val="solid"/>
+          <a:miter lim="800000"/>
+        </a:ln>
+      </a:lnStyleLst>
+      <a:effectStyleLst>
+        <a:effectStyle>
+          <a:effectLst/>
+        </a:effectStyle>
+        <a:effectStyle>
+          <a:effectLst/>
+        </a:effectStyle>
+        <a:effectStyle>
+          <a:effectLst>
+            <a:outerShdw blurRad="57150" dist="19050" dir="5400000" algn="ctr" rotWithShape="0">
+              <a:srgbClr val="000000">
+                <a:alpha val="63000"/>
+              </a:srgbClr>
+            </a:outerShdw>
+          </a:effectLst>
+        </a:effectStyle>
+      </a:effectStyleLst>
+      <a:bgFillStyleLst>
+        <a:solidFill>
+          <a:schemeClr val="phClr"/>
+        </a:solidFill>
+        <a:solidFill>
+          <a:schemeClr val="phClr">
+            <a:tint val="95000"/>
+            <a:satMod val="170000"/>
+          </a:schemeClr>
+        </a:solidFill>
+        <a:gradFill rotWithShape="1">
+          <a:gsLst>
+            <a:gs pos="0">
+              <a:schemeClr val="phClr">
+                <a:tint val="93000"/>
+                <a:satMod val="150000"/>
+                <a:shade val="98000"/>
+                <a:lumMod val="102000"/>
+              </a:schemeClr>
+            </a:gs>
+            <a:gs pos="50000">
+              <a:schemeClr val="phClr">
+                <a:tint val="98000"/>
+                <a:satMod val="130000"/>
+                <a:shade val="90000"/>
+                <a:lumMod val="103000"/>
+              </a:schemeClr>
+            </a:gs>
+            <a:gs pos="100000">
+              <a:schemeClr val="phClr">
+                <a:shade val="63000"/>
+                <a:satMod val="120000"/>
+              </a:schemeClr>
+            </a:gs>
+          </a:gsLst>
+          <a:lin ang="5400000" scaled="0"/>
+        </a:gradFill>
+      </a:bgFillStyleLst>
+    </a:fmtScheme>
+  </a:themeElements>
+  <a:objectDefaults/>
+  <a:extraClrSchemeLst/>
+  <a:extLst>
+    <a:ext uri="{05A4C25C-085E-4340-85A3-A5531E510DB2}">
+      <thm15:themeFamily xmlns:thm15="http://schemas.microsoft.com/office/thememl/2012/main" name="Office Theme" id="{62F939B6-93AF-4DB8-9C6B-D6C7DFDC589F}" vid="{4A3C46E8-61CC-4603-A589-7422A47A8E4A}"/>
+    </a:ext>
+  </a:extLst>
+</a:theme>
 </file>
</xml_diff>